<commit_message>
ppt upload and clean up
</commit_message>
<xml_diff>
--- a/talk/talk.pptx
+++ b/talk/talk.pptx
@@ -5,20 +5,24 @@
     <p:sldMasterId id="2147483648" r:id="rId1"/>
   </p:sldMasterIdLst>
   <p:notesMasterIdLst>
-    <p:notesMasterId r:id="rId13"/>
+    <p:notesMasterId r:id="rId17"/>
   </p:notesMasterIdLst>
   <p:sldIdLst>
     <p:sldId id="256" r:id="rId2"/>
-    <p:sldId id="258" r:id="rId3"/>
-    <p:sldId id="257" r:id="rId4"/>
-    <p:sldId id="259" r:id="rId5"/>
-    <p:sldId id="260" r:id="rId6"/>
-    <p:sldId id="261" r:id="rId7"/>
-    <p:sldId id="262" r:id="rId8"/>
+    <p:sldId id="257" r:id="rId3"/>
+    <p:sldId id="259" r:id="rId4"/>
+    <p:sldId id="260" r:id="rId5"/>
+    <p:sldId id="262" r:id="rId6"/>
+    <p:sldId id="271" r:id="rId7"/>
+    <p:sldId id="265" r:id="rId8"/>
     <p:sldId id="263" r:id="rId9"/>
     <p:sldId id="264" r:id="rId10"/>
-    <p:sldId id="265" r:id="rId11"/>
-    <p:sldId id="266" r:id="rId12"/>
+    <p:sldId id="266" r:id="rId11"/>
+    <p:sldId id="267" r:id="rId12"/>
+    <p:sldId id="268" r:id="rId13"/>
+    <p:sldId id="270" r:id="rId14"/>
+    <p:sldId id="269" r:id="rId15"/>
+    <p:sldId id="261" r:id="rId16"/>
   </p:sldIdLst>
   <p:sldSz cx="13004800" cy="9753600"/>
   <p:notesSz cx="6858000" cy="9144000"/>
@@ -320,6 +324,11 @@
       </a:defRPr>
     </a:lvl9pPr>
   </p:defaultTextStyle>
+  <p:extLst>
+    <p:ext uri="{EFAFB233-063F-42B5-8137-9DF3F51BA10A}">
+      <p15:sldGuideLst xmlns:p15="http://schemas.microsoft.com/office/powerpoint/2012/main"/>
+    </p:ext>
+  </p:extLst>
 </p:presentation>
 </file>
 
@@ -479,7 +488,340 @@
 </p:notesMaster>
 </file>
 
+<file path=ppt/notesSlides/notesSlide1.xml><?xml version="1.0" encoding="utf-8"?>
+<p:notes xmlns:a="http://schemas.openxmlformats.org/drawingml/2006/main" xmlns:r="http://schemas.openxmlformats.org/officeDocument/2006/relationships" xmlns:p="http://schemas.openxmlformats.org/presentationml/2006/main">
+  <p:cSld>
+    <p:spTree>
+      <p:nvGrpSpPr>
+        <p:cNvPr id="1" name=""/>
+        <p:cNvGrpSpPr/>
+        <p:nvPr/>
+      </p:nvGrpSpPr>
+      <p:grpSpPr>
+        <a:xfrm>
+          <a:off x="0" y="0"/>
+          <a:ext cx="0" cy="0"/>
+          <a:chOff x="0" y="0"/>
+          <a:chExt cx="0" cy="0"/>
+        </a:xfrm>
+      </p:grpSpPr>
+      <p:sp>
+        <p:nvSpPr>
+          <p:cNvPr id="2" name="Slide Image Placeholder 1"/>
+          <p:cNvSpPr>
+            <a:spLocks noGrp="1" noRot="1" noChangeAspect="1"/>
+          </p:cNvSpPr>
+          <p:nvPr>
+            <p:ph type="sldImg"/>
+          </p:nvPr>
+        </p:nvSpPr>
+        <p:spPr/>
+      </p:sp>
+      <p:sp>
+        <p:nvSpPr>
+          <p:cNvPr id="3" name="Notes Placeholder 2"/>
+          <p:cNvSpPr>
+            <a:spLocks noGrp="1"/>
+          </p:cNvSpPr>
+          <p:nvPr>
+            <p:ph type="body" idx="1"/>
+          </p:nvPr>
+        </p:nvSpPr>
+        <p:spPr/>
+        <p:txBody>
+          <a:bodyPr/>
+          <a:lstStyle/>
+          <a:p>
+            <a:endParaRPr lang="en-IN" dirty="0"/>
+          </a:p>
+        </p:txBody>
+      </p:sp>
+    </p:spTree>
+    <p:extLst>
+      <p:ext uri="{BB962C8B-B14F-4D97-AF65-F5344CB8AC3E}">
+        <p14:creationId xmlns:p14="http://schemas.microsoft.com/office/powerpoint/2010/main" val="2942594356"/>
+      </p:ext>
+    </p:extLst>
+  </p:cSld>
+  <p:clrMapOvr>
+    <a:masterClrMapping/>
+  </p:clrMapOvr>
+</p:notes>
+</file>
+
 <file path=ppt/slideLayouts/slideLayout1.xml><?xml version="1.0" encoding="utf-8"?>
+<p:sldLayout xmlns:a="http://schemas.openxmlformats.org/drawingml/2006/main" xmlns:r="http://schemas.openxmlformats.org/officeDocument/2006/relationships" xmlns:p="http://schemas.openxmlformats.org/presentationml/2006/main" type="tx">
+  <p:cSld name="Title &amp; Bullets">
+    <p:spTree>
+      <p:nvGrpSpPr>
+        <p:cNvPr id="1" name=""/>
+        <p:cNvGrpSpPr/>
+        <p:nvPr/>
+      </p:nvGrpSpPr>
+      <p:grpSpPr>
+        <a:xfrm>
+          <a:off x="0" y="0"/>
+          <a:ext cx="0" cy="0"/>
+          <a:chOff x="0" y="0"/>
+          <a:chExt cx="0" cy="0"/>
+        </a:xfrm>
+      </p:grpSpPr>
+      <p:sp>
+        <p:nvSpPr>
+          <p:cNvPr id="12" name="Title Text"/>
+          <p:cNvSpPr>
+            <a:spLocks noGrp="1"/>
+          </p:cNvSpPr>
+          <p:nvPr>
+            <p:ph type="title"/>
+          </p:nvPr>
+        </p:nvSpPr>
+        <p:spPr>
+          <a:prstGeom prst="rect">
+            <a:avLst/>
+          </a:prstGeom>
+        </p:spPr>
+        <p:txBody>
+          <a:bodyPr/>
+          <a:lstStyle/>
+          <a:p>
+            <a:r>
+              <a:t>Title Text</a:t>
+            </a:r>
+          </a:p>
+        </p:txBody>
+      </p:sp>
+      <p:sp>
+        <p:nvSpPr>
+          <p:cNvPr id="13" name="Body Level One…"/>
+          <p:cNvSpPr>
+            <a:spLocks noGrp="1"/>
+          </p:cNvSpPr>
+          <p:nvPr>
+            <p:ph type="body" idx="1"/>
+          </p:nvPr>
+        </p:nvSpPr>
+        <p:spPr>
+          <a:prstGeom prst="rect">
+            <a:avLst/>
+          </a:prstGeom>
+        </p:spPr>
+        <p:txBody>
+          <a:bodyPr/>
+          <a:lstStyle/>
+          <a:p>
+            <a:r>
+              <a:t>Body Level One</a:t>
+            </a:r>
+          </a:p>
+          <a:p>
+            <a:pPr lvl="1"/>
+            <a:r>
+              <a:t>Body Level Two</a:t>
+            </a:r>
+          </a:p>
+          <a:p>
+            <a:pPr lvl="2"/>
+            <a:r>
+              <a:t>Body Level Three</a:t>
+            </a:r>
+          </a:p>
+          <a:p>
+            <a:pPr lvl="3"/>
+            <a:r>
+              <a:t>Body Level Four</a:t>
+            </a:r>
+          </a:p>
+          <a:p>
+            <a:pPr lvl="4"/>
+            <a:r>
+              <a:t>Body Level Five</a:t>
+            </a:r>
+          </a:p>
+        </p:txBody>
+      </p:sp>
+      <p:sp>
+        <p:nvSpPr>
+          <p:cNvPr id="14" name="Slide Number"/>
+          <p:cNvSpPr>
+            <a:spLocks noGrp="1"/>
+          </p:cNvSpPr>
+          <p:nvPr>
+            <p:ph type="sldNum" sz="quarter" idx="2"/>
+          </p:nvPr>
+        </p:nvSpPr>
+        <p:spPr>
+          <a:prstGeom prst="rect">
+            <a:avLst/>
+          </a:prstGeom>
+        </p:spPr>
+        <p:txBody>
+          <a:bodyPr/>
+          <a:lstStyle/>
+          <a:p>
+            <a:fld id="{86CB4B4D-7CA3-9044-876B-883B54F8677D}" type="slidenum">
+              <a:t>‹#›</a:t>
+            </a:fld>
+            <a:endParaRPr/>
+          </a:p>
+        </p:txBody>
+      </p:sp>
+    </p:spTree>
+  </p:cSld>
+  <p:clrMapOvr>
+    <a:masterClrMapping/>
+  </p:clrMapOvr>
+  <p:transition spd="med"/>
+</p:sldLayout>
+</file>
+
+<file path=ppt/slideLayouts/slideLayout2.xml><?xml version="1.0" encoding="utf-8"?>
+<p:sldLayout xmlns:a="http://schemas.openxmlformats.org/drawingml/2006/main" xmlns:r="http://schemas.openxmlformats.org/officeDocument/2006/relationships" xmlns:p="http://schemas.openxmlformats.org/presentationml/2006/main" showMasterSp="0" type="tx">
+  <p:cSld name="Bullets">
+    <p:spTree>
+      <p:nvGrpSpPr>
+        <p:cNvPr id="1" name=""/>
+        <p:cNvGrpSpPr/>
+        <p:nvPr/>
+      </p:nvGrpSpPr>
+      <p:grpSpPr>
+        <a:xfrm>
+          <a:off x="0" y="0"/>
+          <a:ext cx="0" cy="0"/>
+          <a:chOff x="0" y="0"/>
+          <a:chExt cx="0" cy="0"/>
+        </a:xfrm>
+      </p:grpSpPr>
+      <p:sp>
+        <p:nvSpPr>
+          <p:cNvPr id="21" name="Body Level One…"/>
+          <p:cNvSpPr>
+            <a:spLocks noGrp="1"/>
+          </p:cNvSpPr>
+          <p:nvPr>
+            <p:ph type="body" idx="1"/>
+          </p:nvPr>
+        </p:nvSpPr>
+        <p:spPr>
+          <a:xfrm>
+            <a:off x="1270000" y="1270000"/>
+            <a:ext cx="10464800" cy="7213600"/>
+          </a:xfrm>
+          <a:prstGeom prst="rect">
+            <a:avLst/>
+          </a:prstGeom>
+        </p:spPr>
+        <p:txBody>
+          <a:bodyPr/>
+          <a:lstStyle>
+            <a:lvl1pPr marL="0" indent="0">
+              <a:spcBef>
+                <a:spcPts val="4800"/>
+              </a:spcBef>
+              <a:buSzTx/>
+              <a:buNone/>
+              <a:defRPr sz="4200"/>
+            </a:lvl1pPr>
+            <a:lvl2pPr marL="0" indent="0">
+              <a:spcBef>
+                <a:spcPts val="4800"/>
+              </a:spcBef>
+              <a:buSzTx/>
+              <a:buNone/>
+              <a:defRPr sz="4200"/>
+            </a:lvl2pPr>
+            <a:lvl3pPr marL="0" indent="0">
+              <a:spcBef>
+                <a:spcPts val="4800"/>
+              </a:spcBef>
+              <a:buSzTx/>
+              <a:buNone/>
+              <a:defRPr sz="4200"/>
+            </a:lvl3pPr>
+            <a:lvl4pPr marL="0" indent="0">
+              <a:spcBef>
+                <a:spcPts val="4800"/>
+              </a:spcBef>
+              <a:buSzTx/>
+              <a:buNone/>
+              <a:defRPr sz="4200"/>
+            </a:lvl4pPr>
+            <a:lvl5pPr marL="0" indent="0">
+              <a:spcBef>
+                <a:spcPts val="4800"/>
+              </a:spcBef>
+              <a:buSzTx/>
+              <a:buNone/>
+              <a:defRPr sz="4200"/>
+            </a:lvl5pPr>
+          </a:lstStyle>
+          <a:p>
+            <a:r>
+              <a:t>Body Level One</a:t>
+            </a:r>
+          </a:p>
+          <a:p>
+            <a:pPr lvl="1"/>
+            <a:r>
+              <a:t>Body Level Two</a:t>
+            </a:r>
+          </a:p>
+          <a:p>
+            <a:pPr lvl="2"/>
+            <a:r>
+              <a:t>Body Level Three</a:t>
+            </a:r>
+          </a:p>
+          <a:p>
+            <a:pPr lvl="3"/>
+            <a:r>
+              <a:t>Body Level Four</a:t>
+            </a:r>
+          </a:p>
+          <a:p>
+            <a:pPr lvl="4"/>
+            <a:r>
+              <a:t>Body Level Five</a:t>
+            </a:r>
+          </a:p>
+        </p:txBody>
+      </p:sp>
+      <p:sp>
+        <p:nvSpPr>
+          <p:cNvPr id="22" name="Slide Number"/>
+          <p:cNvSpPr>
+            <a:spLocks noGrp="1"/>
+          </p:cNvSpPr>
+          <p:nvPr>
+            <p:ph type="sldNum" sz="quarter" idx="2"/>
+          </p:nvPr>
+        </p:nvSpPr>
+        <p:spPr>
+          <a:prstGeom prst="rect">
+            <a:avLst/>
+          </a:prstGeom>
+        </p:spPr>
+        <p:txBody>
+          <a:bodyPr/>
+          <a:lstStyle/>
+          <a:p>
+            <a:fld id="{86CB4B4D-7CA3-9044-876B-883B54F8677D}" type="slidenum">
+              <a:t>‹#›</a:t>
+            </a:fld>
+            <a:endParaRPr/>
+          </a:p>
+        </p:txBody>
+      </p:sp>
+    </p:spTree>
+  </p:cSld>
+  <p:clrMapOvr>
+    <a:masterClrMapping/>
+  </p:clrMapOvr>
+  <p:transition spd="med"/>
+</p:sldLayout>
+</file>
+
+<file path=ppt/slideLayouts/slideLayout3.xml><?xml version="1.0" encoding="utf-8"?>
 <p:sldLayout xmlns:a="http://schemas.openxmlformats.org/drawingml/2006/main" xmlns:r="http://schemas.openxmlformats.org/officeDocument/2006/relationships" xmlns:p="http://schemas.openxmlformats.org/presentationml/2006/main" showMasterSp="0" type="tx">
   <p:cSld name="Blank">
     <p:spTree>
@@ -531,7 +873,7 @@
 </p:sldLayout>
 </file>
 
-<file path=ppt/slideLayouts/slideLayout2.xml><?xml version="1.0" encoding="utf-8"?>
+<file path=ppt/slideLayouts/slideLayout4.xml><?xml version="1.0" encoding="utf-8"?>
 <p:sldLayout xmlns:a="http://schemas.openxmlformats.org/drawingml/2006/main" xmlns:r="http://schemas.openxmlformats.org/officeDocument/2006/relationships" xmlns:p="http://schemas.openxmlformats.org/presentationml/2006/main" type="tx">
   <p:cSld name="Title - Top">
     <p:spTree>
@@ -608,7 +950,7 @@
 </p:sldLayout>
 </file>
 
-<file path=ppt/slideLayouts/slideLayout3.xml><?xml version="1.0" encoding="utf-8"?>
+<file path=ppt/slideLayouts/slideLayout5.xml><?xml version="1.0" encoding="utf-8"?>
 <p:sldLayout xmlns:a="http://schemas.openxmlformats.org/drawingml/2006/main" xmlns:r="http://schemas.openxmlformats.org/officeDocument/2006/relationships" xmlns:p="http://schemas.openxmlformats.org/presentationml/2006/main" showMasterSp="0" type="tx">
   <p:cSld name="Title - Center">
     <p:spTree>
@@ -697,7 +1039,7 @@
 </p:sldLayout>
 </file>
 
-<file path=ppt/slideLayouts/slideLayout4.xml><?xml version="1.0" encoding="utf-8"?>
+<file path=ppt/slideLayouts/slideLayout6.xml><?xml version="1.0" encoding="utf-8"?>
 <p:sldLayout xmlns:a="http://schemas.openxmlformats.org/drawingml/2006/main" xmlns:r="http://schemas.openxmlformats.org/officeDocument/2006/relationships" xmlns:p="http://schemas.openxmlformats.org/presentationml/2006/main" showMasterSp="0" type="tx">
   <p:cSld name="Title &amp; Subtitle">
     <p:spTree>
@@ -877,6 +1219,33 @@
           </a:p>
         </p:txBody>
       </p:sp>
+      <p:pic>
+        <p:nvPicPr>
+          <p:cNvPr id="55" name="cuplv-logo-72ppi_square-gold.png" descr="cuplv-logo-72ppi_square-gold.png"/>
+          <p:cNvPicPr>
+            <a:picLocks noChangeAspect="1"/>
+          </p:cNvPicPr>
+          <p:nvPr/>
+        </p:nvPicPr>
+        <p:blipFill>
+          <a:blip r:embed="rId2"/>
+          <a:stretch>
+            <a:fillRect/>
+          </a:stretch>
+        </p:blipFill>
+        <p:spPr>
+          <a:xfrm>
+            <a:off x="650279" y="7797800"/>
+            <a:ext cx="1955801" cy="1955800"/>
+          </a:xfrm>
+          <a:prstGeom prst="rect">
+            <a:avLst/>
+          </a:prstGeom>
+          <a:ln w="12700">
+            <a:miter lim="400000"/>
+          </a:ln>
+        </p:spPr>
+      </p:pic>
       <p:sp>
         <p:nvSpPr>
           <p:cNvPr id="56" name="Slide Number"/>
@@ -997,7 +1366,7 @@
           </a:ln>
           <a:extLst>
             <a:ext uri="{C572A759-6A51-4108-AA02-DFA0A04FC94B}">
-              <ma14:wrappingTextBoxFlag xmlns:ma14="http://schemas.microsoft.com/office/mac/drawingml/2011/main" xmlns="" val="1"/>
+              <ma14:wrappingTextBoxFlag xmlns="" xmlns:ma14="http://schemas.microsoft.com/office/mac/drawingml/2011/main" val="1"/>
             </a:ext>
           </a:extLst>
         </p:spPr>
@@ -1034,7 +1403,7 @@
           </a:ln>
           <a:extLst>
             <a:ext uri="{C572A759-6A51-4108-AA02-DFA0A04FC94B}">
-              <ma14:wrappingTextBoxFlag xmlns:ma14="http://schemas.microsoft.com/office/mac/drawingml/2011/main" xmlns="" val="1"/>
+              <ma14:wrappingTextBoxFlag xmlns="" xmlns:ma14="http://schemas.microsoft.com/office/mac/drawingml/2011/main" val="1"/>
             </a:ext>
           </a:extLst>
         </p:spPr>
@@ -1120,10 +1489,12 @@
   </p:cSld>
   <p:clrMap bg1="lt1" tx1="dk1" bg2="lt2" tx2="dk2" accent1="accent1" accent2="accent2" accent3="accent3" accent4="accent4" accent5="accent5" accent6="accent6" hlink="hlink" folHlink="folHlink"/>
   <p:sldLayoutIdLst>
-    <p:sldLayoutId id="2147483651" r:id="rId1"/>
-    <p:sldLayoutId id="2147483652" r:id="rId2"/>
-    <p:sldLayoutId id="2147483653" r:id="rId3"/>
-    <p:sldLayoutId id="2147483654" r:id="rId4"/>
+    <p:sldLayoutId id="2147483649" r:id="rId1"/>
+    <p:sldLayoutId id="2147483650" r:id="rId2"/>
+    <p:sldLayoutId id="2147483651" r:id="rId3"/>
+    <p:sldLayoutId id="2147483652" r:id="rId4"/>
+    <p:sldLayoutId id="2147483653" r:id="rId5"/>
+    <p:sldLayoutId id="2147483654" r:id="rId6"/>
   </p:sldLayoutIdLst>
   <p:transition spd="med"/>
   <p:txStyles>
@@ -1949,7 +2320,7 @@
         </p:nvSpPr>
         <p:spPr>
           <a:xfrm>
-            <a:off x="1270000" y="685800"/>
+            <a:off x="1270000" y="1705707"/>
             <a:ext cx="10464800" cy="3302000"/>
           </a:xfrm>
           <a:prstGeom prst="rect">
@@ -1965,8 +2336,14 @@
           </a:lstStyle>
           <a:p>
             <a:r>
-              <a:t>TITLE</a:t>
-            </a:r>
+              <a:rPr lang="en-US" dirty="0" err="1"/>
+              <a:t>Skja</a:t>
+            </a:r>
+            <a:r>
+              <a:rPr lang="en-US" dirty="0"/>
+              <a:t>: Adversarial Logic on Steroids</a:t>
+            </a:r>
+            <a:endParaRPr dirty="0"/>
           </a:p>
         </p:txBody>
       </p:sp>
@@ -1997,8 +2374,8 @@
               <a:defRPr sz="2400"/>
             </a:pPr>
             <a:r>
-              <a:rPr dirty="0"/>
-              <a:t>PLACE</a:t>
+              <a:rPr lang="en-IN" sz="2400" dirty="0"/>
+              <a:t>Final Project, CSCI – 7135</a:t>
             </a:r>
           </a:p>
           <a:p>
@@ -2006,22 +2383,29 @@
               <a:defRPr sz="2400"/>
             </a:pPr>
             <a:r>
-              <a:rPr dirty="0"/>
-              <a:t>DATE</a:t>
-            </a:r>
+              <a:rPr lang="en-IN" sz="2400" dirty="0"/>
+              <a:t>ECCE 1B47</a:t>
+            </a:r>
+            <a:endParaRPr dirty="0"/>
+          </a:p>
+          <a:p>
+            <a:pPr>
+              <a:defRPr sz="2400"/>
+            </a:pPr>
+            <a:endParaRPr dirty="0"/>
           </a:p>
         </p:txBody>
       </p:sp>
       <p:sp>
         <p:nvSpPr>
-          <p:cNvPr id="67" name="AUTHOR 2"/>
+          <p:cNvPr id="69" name="AUTHOR 1"/>
           <p:cNvSpPr/>
           <p:nvPr/>
         </p:nvSpPr>
         <p:spPr>
           <a:xfrm>
-            <a:off x="5765031" y="6087082"/>
-            <a:ext cx="1474738" cy="436936"/>
+            <a:off x="4829268" y="5880061"/>
+            <a:ext cx="3603551" cy="533479"/>
           </a:xfrm>
           <a:prstGeom prst="rect">
             <a:avLst/>
@@ -2031,7 +2415,7 @@
           </a:ln>
           <a:extLst>
             <a:ext uri="{C572A759-6A51-4108-AA02-DFA0A04FC94B}">
-              <ma14:wrappingTextBoxFlag xmlns:ma14="http://schemas.microsoft.com/office/mac/drawingml/2011/main" xmlns="" val="1"/>
+              <ma14:wrappingTextBoxFlag xmlns="" xmlns:ma14="http://schemas.microsoft.com/office/mac/drawingml/2011/main" val="1"/>
             </a:ext>
           </a:extLst>
         </p:spPr>
@@ -2046,86 +2430,10 @@
           </a:lstStyle>
           <a:p>
             <a:r>
-              <a:t>AUTHOR 2</a:t>
-            </a:r>
-          </a:p>
-        </p:txBody>
-      </p:sp>
-      <p:sp>
-        <p:nvSpPr>
-          <p:cNvPr id="68" name="AUTHOR 3"/>
-          <p:cNvSpPr/>
-          <p:nvPr/>
-        </p:nvSpPr>
-        <p:spPr>
-          <a:xfrm>
-            <a:off x="8807983" y="6087082"/>
-            <a:ext cx="2410892" cy="436936"/>
-          </a:xfrm>
-          <a:prstGeom prst="rect">
-            <a:avLst/>
-          </a:prstGeom>
-          <a:ln w="12700">
-            <a:miter lim="400000"/>
-          </a:ln>
-          <a:extLst>
-            <a:ext uri="{C572A759-6A51-4108-AA02-DFA0A04FC94B}">
-              <ma14:wrappingTextBoxFlag xmlns:ma14="http://schemas.microsoft.com/office/mac/drawingml/2011/main" xmlns="" val="1"/>
-            </a:ext>
-          </a:extLst>
-        </p:spPr>
-        <p:txBody>
-          <a:bodyPr wrap="none" lIns="50800" tIns="50800" rIns="50800" bIns="50800" anchor="ctr">
-            <a:spAutoFit/>
-          </a:bodyPr>
-          <a:lstStyle>
-            <a:lvl1pPr algn="ctr">
-              <a:defRPr sz="2000"/>
-            </a:lvl1pPr>
-          </a:lstStyle>
-          <a:p>
-            <a:r>
-              <a:t>AUTHOR 3</a:t>
-            </a:r>
-          </a:p>
-        </p:txBody>
-      </p:sp>
-      <p:sp>
-        <p:nvSpPr>
-          <p:cNvPr id="69" name="AUTHOR 1"/>
-          <p:cNvSpPr/>
-          <p:nvPr/>
-        </p:nvSpPr>
-        <p:spPr>
-          <a:xfrm>
-            <a:off x="2132241" y="6087082"/>
-            <a:ext cx="1718259" cy="436936"/>
-          </a:xfrm>
-          <a:prstGeom prst="rect">
-            <a:avLst/>
-          </a:prstGeom>
-          <a:ln w="12700">
-            <a:miter lim="400000"/>
-          </a:ln>
-          <a:extLst>
-            <a:ext uri="{C572A759-6A51-4108-AA02-DFA0A04FC94B}">
-              <ma14:wrappingTextBoxFlag xmlns:ma14="http://schemas.microsoft.com/office/mac/drawingml/2011/main" xmlns="" val="1"/>
-            </a:ext>
-          </a:extLst>
-        </p:spPr>
-        <p:txBody>
-          <a:bodyPr wrap="none" lIns="50800" tIns="50800" rIns="50800" bIns="50800" anchor="ctr">
-            <a:spAutoFit/>
-          </a:bodyPr>
-          <a:lstStyle>
-            <a:lvl1pPr algn="ctr">
-              <a:defRPr sz="2000"/>
-            </a:lvl1pPr>
-          </a:lstStyle>
-          <a:p>
-            <a:r>
-              <a:t>AUTHOR 1</a:t>
-            </a:r>
+              <a:rPr lang="en-IN" sz="2800" dirty="0"/>
+              <a:t>Sai Lalith Kumar Aka</a:t>
+            </a:r>
+            <a:endParaRPr sz="2800" dirty="0"/>
           </a:p>
         </p:txBody>
       </p:sp>
@@ -2137,8 +2445,8 @@
         </p:nvSpPr>
         <p:spPr>
           <a:xfrm>
-            <a:off x="3226531" y="6687008"/>
-            <a:ext cx="6553275" cy="684884"/>
+            <a:off x="3466279" y="6731932"/>
+            <a:ext cx="6073778" cy="595035"/>
           </a:xfrm>
           <a:prstGeom prst="rect">
             <a:avLst/>
@@ -2148,7 +2456,7 @@
           </a:ln>
           <a:extLst>
             <a:ext uri="{C572A759-6A51-4108-AA02-DFA0A04FC94B}">
-              <ma14:wrappingTextBoxFlag xmlns:ma14="http://schemas.microsoft.com/office/mac/drawingml/2011/main" xmlns="" val="1"/>
+              <ma14:wrappingTextBoxFlag xmlns="" xmlns:ma14="http://schemas.microsoft.com/office/mac/drawingml/2011/main" val="1"/>
             </a:ext>
           </a:extLst>
         </p:spPr>
@@ -2162,92 +2470,12 @@
               <a:defRPr sz="3600"/>
             </a:pPr>
             <a:r>
+              <a:rPr sz="3200" dirty="0"/>
               <a:t>University of Colorado Boulder</a:t>
             </a:r>
           </a:p>
         </p:txBody>
       </p:sp>
-      <p:pic>
-        <p:nvPicPr>
-          <p:cNvPr id="71" name="generic-female.png" descr="generic-female.png"/>
-          <p:cNvPicPr>
-            <a:picLocks noChangeAspect="1"/>
-          </p:cNvPicPr>
-          <p:nvPr/>
-        </p:nvPicPr>
-        <p:blipFill>
-          <a:blip r:embed="rId2"/>
-          <a:stretch>
-            <a:fillRect/>
-          </a:stretch>
-        </p:blipFill>
-        <p:spPr>
-          <a:xfrm>
-            <a:off x="2343670" y="4762350"/>
-            <a:ext cx="1295401" cy="1295401"/>
-          </a:xfrm>
-          <a:prstGeom prst="rect">
-            <a:avLst/>
-          </a:prstGeom>
-          <a:ln w="12700">
-            <a:miter lim="400000"/>
-          </a:ln>
-        </p:spPr>
-      </p:pic>
-      <p:pic>
-        <p:nvPicPr>
-          <p:cNvPr id="72" name="generic-male.png" descr="generic-male.png"/>
-          <p:cNvPicPr>
-            <a:picLocks noChangeAspect="1"/>
-          </p:cNvPicPr>
-          <p:nvPr/>
-        </p:nvPicPr>
-        <p:blipFill>
-          <a:blip r:embed="rId3"/>
-          <a:stretch>
-            <a:fillRect/>
-          </a:stretch>
-        </p:blipFill>
-        <p:spPr>
-          <a:xfrm>
-            <a:off x="5854700" y="4762350"/>
-            <a:ext cx="1295400" cy="1295401"/>
-          </a:xfrm>
-          <a:prstGeom prst="rect">
-            <a:avLst/>
-          </a:prstGeom>
-          <a:ln w="12700">
-            <a:miter lim="400000"/>
-          </a:ln>
-        </p:spPr>
-      </p:pic>
-      <p:pic>
-        <p:nvPicPr>
-          <p:cNvPr id="73" name="generic-female.png" descr="generic-female.png"/>
-          <p:cNvPicPr>
-            <a:picLocks noChangeAspect="1"/>
-          </p:cNvPicPr>
-          <p:nvPr/>
-        </p:nvPicPr>
-        <p:blipFill>
-          <a:blip r:embed="rId2"/>
-          <a:stretch>
-            <a:fillRect/>
-          </a:stretch>
-        </p:blipFill>
-        <p:spPr>
-          <a:xfrm>
-            <a:off x="9365729" y="4762350"/>
-            <a:ext cx="1295401" cy="1295401"/>
-          </a:xfrm>
-          <a:prstGeom prst="rect">
-            <a:avLst/>
-          </a:prstGeom>
-          <a:ln w="12700">
-            <a:miter lim="400000"/>
-          </a:ln>
-        </p:spPr>
-      </p:pic>
     </p:spTree>
   </p:cSld>
   <p:clrMapOvr>
@@ -2262,13 +2490,7 @@
   <p:cSld>
     <p:spTree>
       <p:nvGrpSpPr>
-        <p:cNvPr id="1" name="">
-          <a:extLst>
-            <a:ext uri="{FF2B5EF4-FFF2-40B4-BE49-F238E27FC236}">
-              <a16:creationId xmlns:a16="http://schemas.microsoft.com/office/drawing/2014/main" id="{885FB232-490D-2C9A-6431-EE7A67DAA947}"/>
-            </a:ext>
-          </a:extLst>
-        </p:cNvPr>
+        <p:cNvPr id="1" name=""/>
         <p:cNvGrpSpPr/>
         <p:nvPr/>
       </p:nvGrpSpPr>
@@ -2285,7 +2507,7 @@
           <p:cNvPr id="2" name="Title 1">
             <a:extLst>
               <a:ext uri="{FF2B5EF4-FFF2-40B4-BE49-F238E27FC236}">
-                <a16:creationId xmlns:a16="http://schemas.microsoft.com/office/drawing/2014/main" id="{7C768186-2FA1-1F79-0455-760952764648}"/>
+                <a16:creationId xmlns:a16="http://schemas.microsoft.com/office/drawing/2014/main" id="{B10C2F69-C284-8824-B683-4EEAAD4F8143}"/>
               </a:ext>
             </a:extLst>
           </p:cNvPr>
@@ -2302,16 +2524,155 @@
           <a:lstStyle/>
           <a:p>
             <a:r>
-              <a:rPr lang="en-US" dirty="0"/>
-              <a:t>Evaluation</a:t>
+              <a:rPr lang="en-IN" dirty="0"/>
+              <a:t>New N-Par rule</a:t>
             </a:r>
           </a:p>
         </p:txBody>
       </p:sp>
+      <p:pic>
+        <p:nvPicPr>
+          <p:cNvPr id="4" name="Picture 3">
+            <a:extLst>
+              <a:ext uri="{FF2B5EF4-FFF2-40B4-BE49-F238E27FC236}">
+                <a16:creationId xmlns:a16="http://schemas.microsoft.com/office/drawing/2014/main" id="{CFC078BC-E187-ED4D-4830-A70DF901E9AB}"/>
+              </a:ext>
+            </a:extLst>
+          </p:cNvPr>
+          <p:cNvPicPr>
+            <a:picLocks noChangeAspect="1"/>
+          </p:cNvPicPr>
+          <p:nvPr/>
+        </p:nvPicPr>
+        <p:blipFill>
+          <a:blip r:embed="rId2"/>
+          <a:stretch>
+            <a:fillRect/>
+          </a:stretch>
+        </p:blipFill>
+        <p:spPr>
+          <a:xfrm>
+            <a:off x="281388" y="4350482"/>
+            <a:ext cx="12278912" cy="1782924"/>
+          </a:xfrm>
+          <a:prstGeom prst="rect">
+            <a:avLst/>
+          </a:prstGeom>
+        </p:spPr>
+      </p:pic>
+      <p:pic>
+        <p:nvPicPr>
+          <p:cNvPr id="6" name="Picture 5">
+            <a:extLst>
+              <a:ext uri="{FF2B5EF4-FFF2-40B4-BE49-F238E27FC236}">
+                <a16:creationId xmlns:a16="http://schemas.microsoft.com/office/drawing/2014/main" id="{75AB49A1-E1FA-1356-F2D8-6FF0B0BC7B1F}"/>
+              </a:ext>
+            </a:extLst>
+          </p:cNvPr>
+          <p:cNvPicPr>
+            <a:picLocks noChangeAspect="1"/>
+          </p:cNvPicPr>
+          <p:nvPr/>
+        </p:nvPicPr>
+        <p:blipFill>
+          <a:blip r:embed="rId3"/>
+          <a:stretch>
+            <a:fillRect/>
+          </a:stretch>
+        </p:blipFill>
+        <p:spPr>
+          <a:xfrm>
+            <a:off x="1634074" y="7707960"/>
+            <a:ext cx="2901835" cy="789615"/>
+          </a:xfrm>
+          <a:prstGeom prst="rect">
+            <a:avLst/>
+          </a:prstGeom>
+        </p:spPr>
+      </p:pic>
+      <p:cxnSp>
+        <p:nvCxnSpPr>
+          <p:cNvPr id="9" name="Straight Arrow Connector 8">
+            <a:extLst>
+              <a:ext uri="{FF2B5EF4-FFF2-40B4-BE49-F238E27FC236}">
+                <a16:creationId xmlns:a16="http://schemas.microsoft.com/office/drawing/2014/main" id="{7A1BDD4F-4B27-821A-209C-515056A95829}"/>
+              </a:ext>
+            </a:extLst>
+          </p:cNvPr>
+          <p:cNvCxnSpPr>
+            <a:cxnSpLocks/>
+            <a:stCxn id="6" idx="3"/>
+            <a:endCxn id="11" idx="1"/>
+          </p:cNvCxnSpPr>
+          <p:nvPr/>
+        </p:nvCxnSpPr>
+        <p:spPr>
+          <a:xfrm>
+            <a:off x="4535909" y="8102768"/>
+            <a:ext cx="4467180" cy="1"/>
+          </a:xfrm>
+          <a:prstGeom prst="straightConnector1">
+            <a:avLst/>
+          </a:prstGeom>
+          <a:noFill/>
+          <a:ln w="25400" cap="flat">
+            <a:solidFill>
+              <a:srgbClr val="000000"/>
+            </a:solidFill>
+            <a:prstDash val="solid"/>
+            <a:miter lim="400000"/>
+            <a:tailEnd type="triangle"/>
+          </a:ln>
+          <a:effectLst/>
+          <a:sp3d/>
+        </p:spPr>
+        <p:style>
+          <a:lnRef idx="0">
+            <a:scrgbClr r="0" g="0" b="0"/>
+          </a:lnRef>
+          <a:fillRef idx="0">
+            <a:scrgbClr r="0" g="0" b="0"/>
+          </a:fillRef>
+          <a:effectRef idx="0">
+            <a:scrgbClr r="0" g="0" b="0"/>
+          </a:effectRef>
+          <a:fontRef idx="none"/>
+        </p:style>
+      </p:cxnSp>
+      <p:pic>
+        <p:nvPicPr>
+          <p:cNvPr id="11" name="Picture 10">
+            <a:extLst>
+              <a:ext uri="{FF2B5EF4-FFF2-40B4-BE49-F238E27FC236}">
+                <a16:creationId xmlns:a16="http://schemas.microsoft.com/office/drawing/2014/main" id="{23A7F1C8-C0FA-F17E-7A04-DA9D1A0D228E}"/>
+              </a:ext>
+            </a:extLst>
+          </p:cNvPr>
+          <p:cNvPicPr>
+            <a:picLocks noChangeAspect="1"/>
+          </p:cNvPicPr>
+          <p:nvPr/>
+        </p:nvPicPr>
+        <p:blipFill>
+          <a:blip r:embed="rId4"/>
+          <a:stretch>
+            <a:fillRect/>
+          </a:stretch>
+        </p:blipFill>
+        <p:spPr>
+          <a:xfrm>
+            <a:off x="9003089" y="7553738"/>
+            <a:ext cx="1773789" cy="1098061"/>
+          </a:xfrm>
+          <a:prstGeom prst="rect">
+            <a:avLst/>
+          </a:prstGeom>
+        </p:spPr>
+      </p:pic>
     </p:spTree>
     <p:extLst>
       <p:ext uri="{BB962C8B-B14F-4D97-AF65-F5344CB8AC3E}">
-        <p14:creationId xmlns:p14="http://schemas.microsoft.com/office/powerpoint/2010/main" val="2020082949"/>
+        <p14:creationId xmlns:p14="http://schemas.microsoft.com/office/powerpoint/2010/main" val="2205447404"/>
       </p:ext>
     </p:extLst>
   </p:cSld>
@@ -2344,7 +2705,7 @@
           <p:cNvPr id="2" name="Title 1">
             <a:extLst>
               <a:ext uri="{FF2B5EF4-FFF2-40B4-BE49-F238E27FC236}">
-                <a16:creationId xmlns:a16="http://schemas.microsoft.com/office/drawing/2014/main" id="{C7F66318-5B77-B4B5-1145-7AD7D8486288}"/>
+                <a16:creationId xmlns:a16="http://schemas.microsoft.com/office/drawing/2014/main" id="{4BD83599-3307-2888-5806-B63D6ADC86F5}"/>
               </a:ext>
             </a:extLst>
           </p:cNvPr>
@@ -2355,22 +2716,61 @@
             <p:ph type="title"/>
           </p:nvPr>
         </p:nvSpPr>
-        <p:spPr/>
+        <p:spPr>
+          <a:xfrm>
+            <a:off x="444500" y="362857"/>
+            <a:ext cx="12115800" cy="1270000"/>
+          </a:xfrm>
+        </p:spPr>
         <p:txBody>
           <a:bodyPr/>
           <a:lstStyle/>
           <a:p>
             <a:r>
-              <a:rPr lang="en-US" dirty="0"/>
-              <a:t>Conclusion</a:t>
-            </a:r>
+              <a:rPr lang="en-US" b="1" dirty="0"/>
+              <a:t>Directed Com Rule (The MitM Enabler)</a:t>
+            </a:r>
+            <a:br>
+              <a:rPr lang="en-US" b="1" dirty="0"/>
+            </a:br>
+            <a:endParaRPr lang="en-IN" dirty="0"/>
           </a:p>
         </p:txBody>
       </p:sp>
+      <p:pic>
+        <p:nvPicPr>
+          <p:cNvPr id="4" name="Picture 3">
+            <a:extLst>
+              <a:ext uri="{FF2B5EF4-FFF2-40B4-BE49-F238E27FC236}">
+                <a16:creationId xmlns:a16="http://schemas.microsoft.com/office/drawing/2014/main" id="{FE103B36-7DD2-6DDD-ECC7-A36EBDD30932}"/>
+              </a:ext>
+            </a:extLst>
+          </p:cNvPr>
+          <p:cNvPicPr>
+            <a:picLocks noChangeAspect="1"/>
+          </p:cNvPicPr>
+          <p:nvPr/>
+        </p:nvPicPr>
+        <p:blipFill>
+          <a:blip r:embed="rId2"/>
+          <a:stretch>
+            <a:fillRect/>
+          </a:stretch>
+        </p:blipFill>
+        <p:spPr>
+          <a:xfrm>
+            <a:off x="1190858" y="3984171"/>
+            <a:ext cx="10623083" cy="2457937"/>
+          </a:xfrm>
+          <a:prstGeom prst="rect">
+            <a:avLst/>
+          </a:prstGeom>
+        </p:spPr>
+      </p:pic>
     </p:spTree>
     <p:extLst>
       <p:ext uri="{BB962C8B-B14F-4D97-AF65-F5344CB8AC3E}">
-        <p14:creationId xmlns:p14="http://schemas.microsoft.com/office/powerpoint/2010/main" val="640595108"/>
+        <p14:creationId xmlns:p14="http://schemas.microsoft.com/office/powerpoint/2010/main" val="1606131546"/>
       </p:ext>
     </p:extLst>
   </p:cSld>
@@ -2381,7 +2781,7 @@
 </p:sld>
 </file>
 
-<file path=ppt/slides/slide2.xml><?xml version="1.0" encoding="utf-8"?>
+<file path=ppt/slides/slide12.xml><?xml version="1.0" encoding="utf-8"?>
 <p:sld xmlns:a="http://schemas.openxmlformats.org/drawingml/2006/main" xmlns:r="http://schemas.openxmlformats.org/officeDocument/2006/relationships" xmlns:p="http://schemas.openxmlformats.org/presentationml/2006/main">
   <p:cSld>
     <p:spTree>
@@ -2403,7 +2803,7 @@
           <p:cNvPr id="2" name="Title 1">
             <a:extLst>
               <a:ext uri="{FF2B5EF4-FFF2-40B4-BE49-F238E27FC236}">
-                <a16:creationId xmlns:a16="http://schemas.microsoft.com/office/drawing/2014/main" id="{B67625C8-497F-C1FE-649B-43FC60697249}"/>
+                <a16:creationId xmlns:a16="http://schemas.microsoft.com/office/drawing/2014/main" id="{81FA34AB-9348-6D74-1E2C-C6F52B31657F}"/>
               </a:ext>
             </a:extLst>
           </p:cNvPr>
@@ -2420,16 +2820,154 @@
           <a:lstStyle/>
           <a:p>
             <a:r>
-              <a:rPr lang="en-US" dirty="0"/>
-              <a:t>[Catch]</a:t>
-            </a:r>
+              <a:rPr lang="en-IN" dirty="0"/>
+              <a:t>Proof sketches will be provided for </a:t>
+            </a:r>
+          </a:p>
+        </p:txBody>
+      </p:sp>
+      <p:sp>
+        <p:nvSpPr>
+          <p:cNvPr id="3" name="TextBox 2">
+            <a:extLst>
+              <a:ext uri="{FF2B5EF4-FFF2-40B4-BE49-F238E27FC236}">
+                <a16:creationId xmlns:a16="http://schemas.microsoft.com/office/drawing/2014/main" id="{C9C0809F-0170-5B6E-B005-329E880E4634}"/>
+              </a:ext>
+            </a:extLst>
+          </p:cNvPr>
+          <p:cNvSpPr txBox="1"/>
+          <p:nvPr/>
+        </p:nvSpPr>
+        <p:spPr>
+          <a:xfrm>
+            <a:off x="444500" y="2562400"/>
+            <a:ext cx="11390449" cy="5273238"/>
+          </a:xfrm>
+          <a:prstGeom prst="rect">
+            <a:avLst/>
+          </a:prstGeom>
+          <a:noFill/>
+          <a:ln w="12700" cap="flat">
+            <a:noFill/>
+            <a:miter lim="400000"/>
+          </a:ln>
+          <a:effectLst/>
+          <a:sp3d/>
+        </p:spPr>
+        <p:style>
+          <a:lnRef idx="0">
+            <a:scrgbClr r="0" g="0" b="0"/>
+          </a:lnRef>
+          <a:fillRef idx="0">
+            <a:scrgbClr r="0" g="0" b="0"/>
+          </a:fillRef>
+          <a:effectRef idx="0">
+            <a:scrgbClr r="0" g="0" b="0"/>
+          </a:effectRef>
+          <a:fontRef idx="none"/>
+        </p:style>
+        <p:txBody>
+          <a:bodyPr rot="0" spcFirstLastPara="1" vertOverflow="overflow" horzOverflow="overflow" vert="horz" wrap="square" lIns="50800" tIns="50800" rIns="50800" bIns="50800" numCol="1" spcCol="38100" rtlCol="0" anchor="ctr">
+            <a:spAutoFit/>
+          </a:bodyPr>
+          <a:lstStyle/>
+          <a:p>
+            <a:pPr marL="0" marR="0" indent="0" algn="l" defTabSz="584200" rtl="0" fontAlgn="auto" latinLnBrk="0" hangingPunct="0">
+              <a:lnSpc>
+                <a:spcPct val="100000"/>
+              </a:lnSpc>
+              <a:spcBef>
+                <a:spcPts val="0"/>
+              </a:spcBef>
+              <a:spcAft>
+                <a:spcPts val="0"/>
+              </a:spcAft>
+              <a:buClrTx/>
+              <a:buSzTx/>
+              <a:buFontTx/>
+              <a:buNone/>
+              <a:tabLst/>
+            </a:pPr>
+            <a:r>
+              <a:rPr lang="en-IN" dirty="0"/>
+              <a:t>Soundness for the new rules</a:t>
+            </a:r>
+          </a:p>
+          <a:p>
+            <a:pPr marL="0" marR="0" indent="0" algn="l" defTabSz="584200" rtl="0" fontAlgn="auto" latinLnBrk="0" hangingPunct="0">
+              <a:lnSpc>
+                <a:spcPct val="100000"/>
+              </a:lnSpc>
+              <a:spcBef>
+                <a:spcPts val="0"/>
+              </a:spcBef>
+              <a:spcAft>
+                <a:spcPts val="0"/>
+              </a:spcAft>
+              <a:buClrTx/>
+              <a:buSzTx/>
+              <a:buFontTx/>
+              <a:buNone/>
+              <a:tabLst/>
+            </a:pPr>
+            <a:endParaRPr lang="en-IN" dirty="0"/>
+          </a:p>
+          <a:p>
+            <a:pPr marL="0" marR="0" indent="0" algn="l" defTabSz="584200" rtl="0" fontAlgn="auto" latinLnBrk="0" hangingPunct="0">
+              <a:lnSpc>
+                <a:spcPct val="100000"/>
+              </a:lnSpc>
+              <a:spcBef>
+                <a:spcPts val="0"/>
+              </a:spcBef>
+              <a:spcAft>
+                <a:spcPts val="0"/>
+              </a:spcAft>
+              <a:buClrTx/>
+              <a:buSzTx/>
+              <a:buFontTx/>
+              <a:buNone/>
+              <a:tabLst/>
+            </a:pPr>
+            <a:r>
+              <a:rPr lang="en-IN" dirty="0"/>
+              <a:t>Logic is robust under structural congruence</a:t>
+            </a:r>
+          </a:p>
+          <a:p>
+            <a:pPr marL="0" marR="0" indent="0" algn="l" defTabSz="584200" rtl="0" fontAlgn="auto" latinLnBrk="0" hangingPunct="0">
+              <a:lnSpc>
+                <a:spcPct val="100000"/>
+              </a:lnSpc>
+              <a:spcBef>
+                <a:spcPts val="0"/>
+              </a:spcBef>
+              <a:spcAft>
+                <a:spcPts val="0"/>
+              </a:spcAft>
+              <a:buClrTx/>
+              <a:buSzTx/>
+              <a:buFontTx/>
+              <a:buNone/>
+              <a:tabLst/>
+            </a:pPr>
+            <a:endParaRPr lang="en-IN" dirty="0"/>
+          </a:p>
+          <a:p>
+            <a:r>
+              <a:rPr lang="en-IN" dirty="0"/>
+              <a:t>"Adversarial Isolation" Lemma –cannot differentiate if attacker is acting as intercept</a:t>
+            </a:r>
+          </a:p>
+          <a:p>
+            <a:endParaRPr lang="en-IN" dirty="0"/>
           </a:p>
         </p:txBody>
       </p:sp>
     </p:spTree>
     <p:extLst>
       <p:ext uri="{BB962C8B-B14F-4D97-AF65-F5344CB8AC3E}">
-        <p14:creationId xmlns:p14="http://schemas.microsoft.com/office/powerpoint/2010/main" val="376080343"/>
+        <p14:creationId xmlns:p14="http://schemas.microsoft.com/office/powerpoint/2010/main" val="671051220"/>
       </p:ext>
     </p:extLst>
   </p:cSld>
@@ -2440,7 +2978,538 @@
 </p:sld>
 </file>
 
-<file path=ppt/slides/slide3.xml><?xml version="1.0" encoding="utf-8"?>
+<file path=ppt/slides/slide13.xml><?xml version="1.0" encoding="utf-8"?>
+<p:sld xmlns:a="http://schemas.openxmlformats.org/drawingml/2006/main" xmlns:r="http://schemas.openxmlformats.org/officeDocument/2006/relationships" xmlns:p="http://schemas.openxmlformats.org/presentationml/2006/main">
+  <p:cSld>
+    <p:spTree>
+      <p:nvGrpSpPr>
+        <p:cNvPr id="1" name=""/>
+        <p:cNvGrpSpPr/>
+        <p:nvPr/>
+      </p:nvGrpSpPr>
+      <p:grpSpPr>
+        <a:xfrm>
+          <a:off x="0" y="0"/>
+          <a:ext cx="0" cy="0"/>
+          <a:chOff x="0" y="0"/>
+          <a:chExt cx="0" cy="0"/>
+        </a:xfrm>
+      </p:grpSpPr>
+      <p:sp>
+        <p:nvSpPr>
+          <p:cNvPr id="2" name="Title 1">
+            <a:extLst>
+              <a:ext uri="{FF2B5EF4-FFF2-40B4-BE49-F238E27FC236}">
+                <a16:creationId xmlns:a16="http://schemas.microsoft.com/office/drawing/2014/main" id="{C48FE162-77F7-CD9B-1966-EA02AA08A928}"/>
+              </a:ext>
+            </a:extLst>
+          </p:cNvPr>
+          <p:cNvSpPr>
+            <a:spLocks noGrp="1"/>
+          </p:cNvSpPr>
+          <p:nvPr>
+            <p:ph type="title"/>
+          </p:nvPr>
+        </p:nvSpPr>
+        <p:spPr/>
+        <p:txBody>
+          <a:bodyPr/>
+          <a:lstStyle/>
+          <a:p>
+            <a:r>
+              <a:rPr lang="en-IN" dirty="0"/>
+              <a:t>Future work after the current scope is achieved</a:t>
+            </a:r>
+          </a:p>
+        </p:txBody>
+      </p:sp>
+      <p:sp>
+        <p:nvSpPr>
+          <p:cNvPr id="3" name="TextBox 2">
+            <a:extLst>
+              <a:ext uri="{FF2B5EF4-FFF2-40B4-BE49-F238E27FC236}">
+                <a16:creationId xmlns:a16="http://schemas.microsoft.com/office/drawing/2014/main" id="{1B2B25E0-BEE4-4C40-ECE6-DBDECDA39B42}"/>
+              </a:ext>
+            </a:extLst>
+          </p:cNvPr>
+          <p:cNvSpPr txBox="1"/>
+          <p:nvPr/>
+        </p:nvSpPr>
+        <p:spPr>
+          <a:xfrm>
+            <a:off x="836023" y="3421143"/>
+            <a:ext cx="11260183" cy="4626908"/>
+          </a:xfrm>
+          <a:prstGeom prst="rect">
+            <a:avLst/>
+          </a:prstGeom>
+          <a:noFill/>
+          <a:ln w="12700" cap="flat">
+            <a:noFill/>
+            <a:miter lim="400000"/>
+          </a:ln>
+          <a:effectLst/>
+          <a:sp3d/>
+        </p:spPr>
+        <p:style>
+          <a:lnRef idx="0">
+            <a:scrgbClr r="0" g="0" b="0"/>
+          </a:lnRef>
+          <a:fillRef idx="0">
+            <a:scrgbClr r="0" g="0" b="0"/>
+          </a:fillRef>
+          <a:effectRef idx="0">
+            <a:scrgbClr r="0" g="0" b="0"/>
+          </a:effectRef>
+          <a:fontRef idx="none"/>
+        </p:style>
+        <p:txBody>
+          <a:bodyPr rot="0" spcFirstLastPara="1" vertOverflow="overflow" horzOverflow="overflow" vert="horz" wrap="square" lIns="50800" tIns="50800" rIns="50800" bIns="50800" numCol="1" spcCol="38100" rtlCol="0" anchor="ctr">
+            <a:spAutoFit/>
+          </a:bodyPr>
+          <a:lstStyle/>
+          <a:p>
+            <a:pPr marL="0" marR="0" indent="0" algn="l" defTabSz="584200" rtl="0" fontAlgn="auto" latinLnBrk="0" hangingPunct="0">
+              <a:lnSpc>
+                <a:spcPct val="100000"/>
+              </a:lnSpc>
+              <a:spcBef>
+                <a:spcPts val="0"/>
+              </a:spcBef>
+              <a:spcAft>
+                <a:spcPts val="0"/>
+              </a:spcAft>
+              <a:buClrTx/>
+              <a:buSzTx/>
+              <a:buFontTx/>
+              <a:buNone/>
+              <a:tabLst/>
+            </a:pPr>
+            <a:r>
+              <a:rPr lang="en-IN" dirty="0"/>
+              <a:t>Handling Encrypted states – Dolev Yao adversary</a:t>
+            </a:r>
+          </a:p>
+          <a:p>
+            <a:pPr marL="0" marR="0" indent="0" algn="l" defTabSz="584200" rtl="0" fontAlgn="auto" latinLnBrk="0" hangingPunct="0">
+              <a:lnSpc>
+                <a:spcPct val="100000"/>
+              </a:lnSpc>
+              <a:spcBef>
+                <a:spcPts val="0"/>
+              </a:spcBef>
+              <a:spcAft>
+                <a:spcPts val="0"/>
+              </a:spcAft>
+              <a:buClrTx/>
+              <a:buSzTx/>
+              <a:buFontTx/>
+              <a:buNone/>
+              <a:tabLst/>
+            </a:pPr>
+            <a:endParaRPr lang="en-IN" dirty="0"/>
+          </a:p>
+          <a:p>
+            <a:pPr marL="0" marR="0" indent="0" algn="l" defTabSz="584200" rtl="0" fontAlgn="auto" latinLnBrk="0" hangingPunct="0">
+              <a:lnSpc>
+                <a:spcPct val="100000"/>
+              </a:lnSpc>
+              <a:spcBef>
+                <a:spcPts val="0"/>
+              </a:spcBef>
+              <a:spcAft>
+                <a:spcPts val="0"/>
+              </a:spcAft>
+              <a:buClrTx/>
+              <a:buSzTx/>
+              <a:buFontTx/>
+              <a:buNone/>
+              <a:tabLst/>
+            </a:pPr>
+            <a:r>
+              <a:rPr lang="en-IN" dirty="0"/>
+              <a:t>Automated Protocol Synthesis</a:t>
+            </a:r>
+          </a:p>
+          <a:p>
+            <a:pPr marL="0" marR="0" indent="0" algn="l" defTabSz="584200" rtl="0" fontAlgn="auto" latinLnBrk="0" hangingPunct="0">
+              <a:lnSpc>
+                <a:spcPct val="100000"/>
+              </a:lnSpc>
+              <a:spcBef>
+                <a:spcPts val="0"/>
+              </a:spcBef>
+              <a:spcAft>
+                <a:spcPts val="0"/>
+              </a:spcAft>
+              <a:buClrTx/>
+              <a:buSzTx/>
+              <a:buFontTx/>
+              <a:buNone/>
+              <a:tabLst/>
+            </a:pPr>
+            <a:endParaRPr lang="en-IN" dirty="0"/>
+          </a:p>
+          <a:p>
+            <a:r>
+              <a:rPr lang="en-IN" dirty="0"/>
+              <a:t>Quantitative Adversarial Logic for Availability – [er: crash] or [er: exhausted]</a:t>
+            </a:r>
+            <a:endParaRPr lang="en-IN" b="1" dirty="0"/>
+          </a:p>
+        </p:txBody>
+      </p:sp>
+    </p:spTree>
+    <p:extLst>
+      <p:ext uri="{BB962C8B-B14F-4D97-AF65-F5344CB8AC3E}">
+        <p14:creationId xmlns:p14="http://schemas.microsoft.com/office/powerpoint/2010/main" val="2115247539"/>
+      </p:ext>
+    </p:extLst>
+  </p:cSld>
+  <p:clrMapOvr>
+    <a:masterClrMapping/>
+  </p:clrMapOvr>
+  <p:transition spd="med"/>
+</p:sld>
+</file>
+
+<file path=ppt/slides/slide14.xml><?xml version="1.0" encoding="utf-8"?>
+<p:sld xmlns:a="http://schemas.openxmlformats.org/drawingml/2006/main" xmlns:r="http://schemas.openxmlformats.org/officeDocument/2006/relationships" xmlns:p="http://schemas.openxmlformats.org/presentationml/2006/main">
+  <p:cSld>
+    <p:spTree>
+      <p:nvGrpSpPr>
+        <p:cNvPr id="1" name=""/>
+        <p:cNvGrpSpPr/>
+        <p:nvPr/>
+      </p:nvGrpSpPr>
+      <p:grpSpPr>
+        <a:xfrm>
+          <a:off x="0" y="0"/>
+          <a:ext cx="0" cy="0"/>
+          <a:chOff x="0" y="0"/>
+          <a:chExt cx="0" cy="0"/>
+        </a:xfrm>
+      </p:grpSpPr>
+      <p:sp>
+        <p:nvSpPr>
+          <p:cNvPr id="2" name="Title 1">
+            <a:extLst>
+              <a:ext uri="{FF2B5EF4-FFF2-40B4-BE49-F238E27FC236}">
+                <a16:creationId xmlns:a16="http://schemas.microsoft.com/office/drawing/2014/main" id="{AE15D72A-6C5F-3B7F-24B6-473DABDB26A2}"/>
+              </a:ext>
+            </a:extLst>
+          </p:cNvPr>
+          <p:cNvSpPr>
+            <a:spLocks noGrp="1"/>
+          </p:cNvSpPr>
+          <p:nvPr>
+            <p:ph type="title"/>
+          </p:nvPr>
+        </p:nvSpPr>
+        <p:spPr>
+          <a:xfrm>
+            <a:off x="444500" y="101600"/>
+            <a:ext cx="12115800" cy="1270000"/>
+          </a:xfrm>
+        </p:spPr>
+        <p:txBody>
+          <a:bodyPr anchor="ctr">
+            <a:normAutofit/>
+          </a:bodyPr>
+          <a:lstStyle/>
+          <a:p>
+            <a:pPr>
+              <a:lnSpc>
+                <a:spcPct val="90000"/>
+              </a:lnSpc>
+            </a:pPr>
+            <a:r>
+              <a:rPr lang="en-IN" sz="7800"/>
+              <a:t>Thank you and questions</a:t>
+            </a:r>
+          </a:p>
+        </p:txBody>
+      </p:sp>
+      <p:pic>
+        <p:nvPicPr>
+          <p:cNvPr id="4" name="Picture 3" descr="Sticky notes with question marks">
+            <a:extLst>
+              <a:ext uri="{FF2B5EF4-FFF2-40B4-BE49-F238E27FC236}">
+                <a16:creationId xmlns:a16="http://schemas.microsoft.com/office/drawing/2014/main" id="{9244E3A6-989F-A7F9-CEE7-0E621A3C1364}"/>
+              </a:ext>
+            </a:extLst>
+          </p:cNvPr>
+          <p:cNvPicPr>
+            <a:picLocks noChangeAspect="1"/>
+          </p:cNvPicPr>
+          <p:nvPr/>
+        </p:nvPicPr>
+        <p:blipFill>
+          <a:blip r:embed="rId2"/>
+          <a:srcRect t="14025" r="2" b="9433"/>
+          <a:stretch>
+            <a:fillRect/>
+          </a:stretch>
+        </p:blipFill>
+        <p:spPr>
+          <a:xfrm>
+            <a:off x="444500" y="1562100"/>
+            <a:ext cx="12115800" cy="6190285"/>
+          </a:xfrm>
+          <a:prstGeom prst="rect">
+            <a:avLst/>
+          </a:prstGeom>
+          <a:noFill/>
+          <a:ln w="12700">
+            <a:miter lim="400000"/>
+          </a:ln>
+        </p:spPr>
+      </p:pic>
+    </p:spTree>
+    <p:extLst>
+      <p:ext uri="{BB962C8B-B14F-4D97-AF65-F5344CB8AC3E}">
+        <p14:creationId xmlns:p14="http://schemas.microsoft.com/office/powerpoint/2010/main" val="518220987"/>
+      </p:ext>
+    </p:extLst>
+  </p:cSld>
+  <p:clrMapOvr>
+    <a:masterClrMapping/>
+  </p:clrMapOvr>
+  <p:transition spd="med"/>
+</p:sld>
+</file>
+
+<file path=ppt/slides/slide15.xml><?xml version="1.0" encoding="utf-8"?>
+<p:sld xmlns:a="http://schemas.openxmlformats.org/drawingml/2006/main" xmlns:r="http://schemas.openxmlformats.org/officeDocument/2006/relationships" xmlns:p="http://schemas.openxmlformats.org/presentationml/2006/main">
+  <p:cSld>
+    <p:spTree>
+      <p:nvGrpSpPr>
+        <p:cNvPr id="1" name=""/>
+        <p:cNvGrpSpPr/>
+        <p:nvPr/>
+      </p:nvGrpSpPr>
+      <p:grpSpPr>
+        <a:xfrm>
+          <a:off x="0" y="0"/>
+          <a:ext cx="0" cy="0"/>
+          <a:chOff x="0" y="0"/>
+          <a:chExt cx="0" cy="0"/>
+        </a:xfrm>
+      </p:grpSpPr>
+      <p:sp>
+        <p:nvSpPr>
+          <p:cNvPr id="2" name="Title 1">
+            <a:extLst>
+              <a:ext uri="{FF2B5EF4-FFF2-40B4-BE49-F238E27FC236}">
+                <a16:creationId xmlns:a16="http://schemas.microsoft.com/office/drawing/2014/main" id="{5C6AE875-1A4C-5635-B62E-FD6248912D0D}"/>
+              </a:ext>
+            </a:extLst>
+          </p:cNvPr>
+          <p:cNvSpPr>
+            <a:spLocks noGrp="1"/>
+          </p:cNvSpPr>
+          <p:nvPr>
+            <p:ph type="title"/>
+          </p:nvPr>
+        </p:nvSpPr>
+        <p:spPr/>
+        <p:txBody>
+          <a:bodyPr/>
+          <a:lstStyle/>
+          <a:p>
+            <a:r>
+              <a:rPr lang="en-IN" dirty="0"/>
+              <a:t>References</a:t>
+            </a:r>
+          </a:p>
+        </p:txBody>
+      </p:sp>
+      <p:sp>
+        <p:nvSpPr>
+          <p:cNvPr id="4" name="TextBox 3">
+            <a:extLst>
+              <a:ext uri="{FF2B5EF4-FFF2-40B4-BE49-F238E27FC236}">
+                <a16:creationId xmlns:a16="http://schemas.microsoft.com/office/drawing/2014/main" id="{E42D036E-5CFE-D55F-5947-6A154167FB7D}"/>
+              </a:ext>
+            </a:extLst>
+          </p:cNvPr>
+          <p:cNvSpPr txBox="1"/>
+          <p:nvPr/>
+        </p:nvSpPr>
+        <p:spPr>
+          <a:xfrm>
+            <a:off x="353960" y="3779261"/>
+            <a:ext cx="11716119" cy="1179810"/>
+          </a:xfrm>
+          <a:prstGeom prst="rect">
+            <a:avLst/>
+          </a:prstGeom>
+          <a:noFill/>
+          <a:ln w="12700" cap="flat">
+            <a:noFill/>
+            <a:miter lim="400000"/>
+          </a:ln>
+          <a:effectLst/>
+          <a:sp3d/>
+        </p:spPr>
+        <p:style>
+          <a:lnRef idx="0">
+            <a:scrgbClr r="0" g="0" b="0"/>
+          </a:lnRef>
+          <a:fillRef idx="0">
+            <a:scrgbClr r="0" g="0" b="0"/>
+          </a:fillRef>
+          <a:effectRef idx="0">
+            <a:scrgbClr r="0" g="0" b="0"/>
+          </a:effectRef>
+          <a:fontRef idx="none"/>
+        </p:style>
+        <p:txBody>
+          <a:bodyPr rot="0" spcFirstLastPara="1" vertOverflow="overflow" horzOverflow="overflow" vert="horz" wrap="square" lIns="50800" tIns="50800" rIns="50800" bIns="50800" numCol="1" spcCol="38100" rtlCol="0" anchor="ctr">
+            <a:spAutoFit/>
+          </a:bodyPr>
+          <a:lstStyle/>
+          <a:p>
+            <a:r>
+              <a:rPr lang="en-IN" sz="1400" dirty="0"/>
+              <a:t>[1]</a:t>
+            </a:r>
+            <a:r>
+              <a:rPr lang="en-US" sz="1400" dirty="0"/>
+              <a:t> O'Hearn, Peter W. "Incorrectness logic." </a:t>
+            </a:r>
+            <a:r>
+              <a:rPr lang="en-US" sz="1400" i="1" dirty="0"/>
+              <a:t>Proceedings of the ACM on Programming Languages</a:t>
+            </a:r>
+            <a:r>
+              <a:rPr lang="en-US" sz="1400" dirty="0"/>
+              <a:t> 4.POPL (2019): 1-32.</a:t>
+            </a:r>
+            <a:endParaRPr lang="en-IN" sz="1400" dirty="0"/>
+          </a:p>
+          <a:p>
+            <a:r>
+              <a:rPr kumimoji="0" lang="en-IN" sz="1400" b="0" i="0" u="none" strike="noStrike" cap="none" spc="0" normalizeH="0" baseline="0" dirty="0">
+                <a:ln>
+                  <a:noFill/>
+                </a:ln>
+                <a:solidFill>
+                  <a:srgbClr val="000000"/>
+                </a:solidFill>
+                <a:effectLst/>
+                <a:uFillTx/>
+                <a:latin typeface="Futura"/>
+                <a:ea typeface="Futura"/>
+                <a:cs typeface="Futura"/>
+                <a:sym typeface="Futura"/>
+              </a:rPr>
+              <a:t>[2] </a:t>
+            </a:r>
+            <a:r>
+              <a:rPr lang="en-IN" sz="1400" dirty="0"/>
+              <a:t>De Vries, </a:t>
+            </a:r>
+            <a:r>
+              <a:rPr lang="en-IN" sz="1400" dirty="0" err="1"/>
+              <a:t>Edsko</a:t>
+            </a:r>
+            <a:r>
+              <a:rPr lang="en-IN" sz="1400" dirty="0"/>
+              <a:t>, and Vasileios </a:t>
+            </a:r>
+            <a:r>
+              <a:rPr lang="en-IN" sz="1400" dirty="0" err="1"/>
+              <a:t>Koutavas</a:t>
+            </a:r>
+            <a:r>
+              <a:rPr lang="en-IN" sz="1400" dirty="0"/>
+              <a:t>. "Reverse </a:t>
+            </a:r>
+            <a:r>
+              <a:rPr lang="en-IN" sz="1400" dirty="0" err="1"/>
+              <a:t>hoare</a:t>
+            </a:r>
+            <a:r>
+              <a:rPr lang="en-IN" sz="1400" dirty="0"/>
+              <a:t> logic." </a:t>
+            </a:r>
+            <a:r>
+              <a:rPr lang="en-IN" sz="1400" i="1" dirty="0"/>
+              <a:t>International Conference on Software Engineering and Formal Methods</a:t>
+            </a:r>
+            <a:r>
+              <a:rPr lang="en-IN" sz="1400" dirty="0"/>
+              <a:t>. Berlin, Heidelberg: Springer Berlin Heidelberg, 2011.</a:t>
+            </a:r>
+            <a:endParaRPr kumimoji="0" lang="en-IN" sz="1400" b="0" i="0" u="none" strike="noStrike" cap="none" spc="0" normalizeH="0" baseline="0" dirty="0">
+              <a:ln>
+                <a:noFill/>
+              </a:ln>
+              <a:solidFill>
+                <a:srgbClr val="000000"/>
+              </a:solidFill>
+              <a:effectLst/>
+              <a:uFillTx/>
+              <a:latin typeface="Futura"/>
+              <a:ea typeface="Futura"/>
+              <a:cs typeface="Futura"/>
+              <a:sym typeface="Futura"/>
+            </a:endParaRPr>
+          </a:p>
+          <a:p>
+            <a:r>
+              <a:rPr lang="en-IN" sz="1400" dirty="0"/>
+              <a:t>[3] </a:t>
+            </a:r>
+            <a:r>
+              <a:rPr lang="en-US" sz="1400" dirty="0" err="1"/>
+              <a:t>Cousot</a:t>
+            </a:r>
+            <a:r>
+              <a:rPr lang="en-US" sz="1400" dirty="0"/>
+              <a:t>, Patrick. "Calculational design of [in] correctness transformational program logics by abstract interpretation." </a:t>
+            </a:r>
+            <a:r>
+              <a:rPr lang="en-US" sz="1400" i="1" dirty="0"/>
+              <a:t>Proceedings of the ACM on Programming Languages</a:t>
+            </a:r>
+            <a:r>
+              <a:rPr lang="en-US" sz="1400" dirty="0"/>
+              <a:t> 8.POPL (2024): 175-208.</a:t>
+            </a:r>
+            <a:endParaRPr kumimoji="0" lang="en-IN" sz="1400" b="0" i="0" u="none" strike="noStrike" cap="none" spc="0" normalizeH="0" baseline="0" dirty="0">
+              <a:ln>
+                <a:noFill/>
+              </a:ln>
+              <a:solidFill>
+                <a:srgbClr val="000000"/>
+              </a:solidFill>
+              <a:effectLst/>
+              <a:uFillTx/>
+              <a:latin typeface="Futura"/>
+              <a:ea typeface="Futura"/>
+              <a:cs typeface="Futura"/>
+              <a:sym typeface="Futura"/>
+            </a:endParaRPr>
+          </a:p>
+        </p:txBody>
+      </p:sp>
+    </p:spTree>
+    <p:extLst>
+      <p:ext uri="{BB962C8B-B14F-4D97-AF65-F5344CB8AC3E}">
+        <p14:creationId xmlns:p14="http://schemas.microsoft.com/office/powerpoint/2010/main" val="3170960535"/>
+      </p:ext>
+    </p:extLst>
+  </p:cSld>
+  <p:clrMapOvr>
+    <a:masterClrMapping/>
+  </p:clrMapOvr>
+  <p:transition spd="med"/>
+</p:sld>
+</file>
+
+<file path=ppt/slides/slide2.xml><?xml version="1.0" encoding="utf-8"?>
 <p:sld xmlns:a="http://schemas.openxmlformats.org/drawingml/2006/main" xmlns:r="http://schemas.openxmlformats.org/officeDocument/2006/relationships" xmlns:p="http://schemas.openxmlformats.org/presentationml/2006/main">
   <p:cSld>
     <p:spTree>
@@ -2477,8 +3546,8 @@
           <a:lstStyle/>
           <a:p>
             <a:r>
-              <a:rPr lang="en-US" dirty="0"/>
-              <a:t>[What is the problem?]</a:t>
+              <a:rPr lang="en-IN" dirty="0"/>
+              <a:t>Incorrectness Logic [1][2] </a:t>
             </a:r>
             <a:endParaRPr dirty="0"/>
           </a:p>
@@ -2504,7 +3573,7 @@
           </a:prstGeom>
           <a:extLst>
             <a:ext uri="{C572A759-6A51-4108-AA02-DFA0A04FC94B}">
-              <ma14:wrappingTextBoxFlag xmlns:ma14="http://schemas.microsoft.com/office/mac/drawingml/2011/main" xmlns="" val="1"/>
+              <ma14:wrappingTextBoxFlag xmlns="" xmlns:ma14="http://schemas.microsoft.com/office/mac/drawingml/2011/main" val="1"/>
             </a:ext>
           </a:extLst>
         </p:spPr>
@@ -2514,13 +3583,341 @@
           <a:p>
             <a:fld id="{86CB4B4D-7CA3-9044-876B-883B54F8677D}" type="slidenum">
               <a:rPr/>
-              <a:t>3</a:t>
+              <a:t>2</a:t>
             </a:fld>
             <a:endParaRPr/>
+          </a:p>
+        </p:txBody>
+      </p:sp>
+      <p:sp>
+        <p:nvSpPr>
+          <p:cNvPr id="2" name="TextBox 1">
+            <a:extLst>
+              <a:ext uri="{FF2B5EF4-FFF2-40B4-BE49-F238E27FC236}">
+                <a16:creationId xmlns:a16="http://schemas.microsoft.com/office/drawing/2014/main" id="{D1E49FF3-9482-F632-9956-E7F9C03C6382}"/>
+              </a:ext>
+            </a:extLst>
+          </p:cNvPr>
+          <p:cNvSpPr txBox="1"/>
+          <p:nvPr/>
+        </p:nvSpPr>
+        <p:spPr>
+          <a:xfrm>
+            <a:off x="513243" y="2110666"/>
+            <a:ext cx="10813518" cy="3334246"/>
+          </a:xfrm>
+          <a:prstGeom prst="rect">
+            <a:avLst/>
+          </a:prstGeom>
+          <a:noFill/>
+          <a:ln w="12700" cap="flat">
+            <a:noFill/>
+            <a:miter lim="400000"/>
+          </a:ln>
+          <a:effectLst/>
+          <a:sp3d/>
+        </p:spPr>
+        <p:style>
+          <a:lnRef idx="0">
+            <a:scrgbClr r="0" g="0" b="0"/>
+          </a:lnRef>
+          <a:fillRef idx="0">
+            <a:scrgbClr r="0" g="0" b="0"/>
+          </a:fillRef>
+          <a:effectRef idx="0">
+            <a:scrgbClr r="0" g="0" b="0"/>
+          </a:effectRef>
+          <a:fontRef idx="none"/>
+        </p:style>
+        <p:txBody>
+          <a:bodyPr rot="0" spcFirstLastPara="1" vertOverflow="overflow" horzOverflow="overflow" vert="horz" wrap="square" lIns="50800" tIns="50800" rIns="50800" bIns="50800" numCol="1" spcCol="38100" rtlCol="0" anchor="ctr">
+            <a:spAutoFit/>
+          </a:bodyPr>
+          <a:lstStyle/>
+          <a:p>
+            <a:pPr marL="0" marR="0" indent="0" algn="l" defTabSz="584200" rtl="0" fontAlgn="auto" latinLnBrk="0" hangingPunct="0">
+              <a:lnSpc>
+                <a:spcPct val="100000"/>
+              </a:lnSpc>
+              <a:spcBef>
+                <a:spcPts val="0"/>
+              </a:spcBef>
+              <a:spcAft>
+                <a:spcPts val="0"/>
+              </a:spcAft>
+              <a:buClrTx/>
+              <a:buSzTx/>
+              <a:buFontTx/>
+              <a:buNone/>
+              <a:tabLst/>
+            </a:pPr>
+            <a:r>
+              <a:rPr lang="en-IN" dirty="0"/>
+              <a:t>Very interesting paradigm of under-approximate triples  </a:t>
+            </a:r>
+          </a:p>
+          <a:p>
+            <a:pPr marL="0" marR="0" indent="0" algn="l" defTabSz="584200" rtl="0" fontAlgn="auto" latinLnBrk="0" hangingPunct="0">
+              <a:lnSpc>
+                <a:spcPct val="100000"/>
+              </a:lnSpc>
+              <a:spcBef>
+                <a:spcPts val="0"/>
+              </a:spcBef>
+              <a:spcAft>
+                <a:spcPts val="0"/>
+              </a:spcAft>
+              <a:buClrTx/>
+              <a:buSzTx/>
+              <a:buFontTx/>
+              <a:buNone/>
+              <a:tabLst/>
+            </a:pPr>
+            <a:endParaRPr kumimoji="0" lang="en-IN" sz="4200" b="0" i="0" u="none" strike="noStrike" cap="none" spc="0" normalizeH="0" baseline="0" dirty="0">
+              <a:ln>
+                <a:noFill/>
+              </a:ln>
+              <a:solidFill>
+                <a:srgbClr val="000000"/>
+              </a:solidFill>
+              <a:effectLst/>
+              <a:uFillTx/>
+              <a:latin typeface="Futura"/>
+              <a:ea typeface="Futura"/>
+              <a:cs typeface="Futura"/>
+              <a:sym typeface="Futura"/>
+            </a:endParaRPr>
+          </a:p>
+          <a:p>
+            <a:pPr marL="0" marR="0" indent="0" algn="l" defTabSz="584200" rtl="0" fontAlgn="auto" latinLnBrk="0" hangingPunct="0">
+              <a:lnSpc>
+                <a:spcPct val="100000"/>
+              </a:lnSpc>
+              <a:spcBef>
+                <a:spcPts val="0"/>
+              </a:spcBef>
+              <a:spcAft>
+                <a:spcPts val="0"/>
+              </a:spcAft>
+              <a:buClrTx/>
+              <a:buSzTx/>
+              <a:buFontTx/>
+              <a:buNone/>
+              <a:tabLst/>
+            </a:pPr>
+            <a:endParaRPr lang="en-IN" dirty="0"/>
+          </a:p>
+          <a:p>
+            <a:pPr marL="0" marR="0" indent="0" algn="l" defTabSz="584200" rtl="0" fontAlgn="auto" latinLnBrk="0" hangingPunct="0">
+              <a:lnSpc>
+                <a:spcPct val="100000"/>
+              </a:lnSpc>
+              <a:spcBef>
+                <a:spcPts val="0"/>
+              </a:spcBef>
+              <a:spcAft>
+                <a:spcPts val="0"/>
+              </a:spcAft>
+              <a:buClrTx/>
+              <a:buSzTx/>
+              <a:buFontTx/>
+              <a:buNone/>
+              <a:tabLst/>
+            </a:pPr>
+            <a:endParaRPr kumimoji="0" lang="en-IN" sz="4200" b="0" i="0" u="none" strike="noStrike" cap="none" spc="0" normalizeH="0" baseline="0" dirty="0">
+              <a:ln>
+                <a:noFill/>
+              </a:ln>
+              <a:solidFill>
+                <a:srgbClr val="000000"/>
+              </a:solidFill>
+              <a:effectLst/>
+              <a:uFillTx/>
+              <a:latin typeface="Futura"/>
+              <a:ea typeface="Futura"/>
+              <a:cs typeface="Futura"/>
+              <a:sym typeface="Futura"/>
+            </a:endParaRPr>
+          </a:p>
+        </p:txBody>
+      </p:sp>
+      <p:pic>
+        <p:nvPicPr>
+          <p:cNvPr id="4" name="Picture 3" descr="A diagram of a graph&#10;&#10;AI-generated content may be incorrect.">
+            <a:extLst>
+              <a:ext uri="{FF2B5EF4-FFF2-40B4-BE49-F238E27FC236}">
+                <a16:creationId xmlns:a16="http://schemas.microsoft.com/office/drawing/2014/main" id="{04C3A662-B030-8F08-2B51-A8A84A0937B7}"/>
+              </a:ext>
+            </a:extLst>
+          </p:cNvPr>
+          <p:cNvPicPr>
+            <a:picLocks noChangeAspect="1"/>
+          </p:cNvPicPr>
+          <p:nvPr/>
+        </p:nvPicPr>
+        <p:blipFill>
+          <a:blip r:embed="rId2"/>
+          <a:stretch>
+            <a:fillRect/>
+          </a:stretch>
+        </p:blipFill>
+        <p:spPr>
+          <a:xfrm>
+            <a:off x="2513002" y="3976495"/>
+            <a:ext cx="7737494" cy="4755118"/>
+          </a:xfrm>
+          <a:prstGeom prst="rect">
+            <a:avLst/>
+          </a:prstGeom>
+        </p:spPr>
+      </p:pic>
+    </p:spTree>
+  </p:cSld>
+  <p:clrMapOvr>
+    <a:masterClrMapping/>
+  </p:clrMapOvr>
+  <p:transition spd="med"/>
+</p:sld>
+</file>
+
+<file path=ppt/slides/slide3.xml><?xml version="1.0" encoding="utf-8"?>
+<p:sld xmlns:a="http://schemas.openxmlformats.org/drawingml/2006/main" xmlns:r="http://schemas.openxmlformats.org/officeDocument/2006/relationships" xmlns:p="http://schemas.openxmlformats.org/presentationml/2006/main">
+  <p:cSld>
+    <p:spTree>
+      <p:nvGrpSpPr>
+        <p:cNvPr id="1" name=""/>
+        <p:cNvGrpSpPr/>
+        <p:nvPr/>
+      </p:nvGrpSpPr>
+      <p:grpSpPr>
+        <a:xfrm>
+          <a:off x="0" y="0"/>
+          <a:ext cx="0" cy="0"/>
+          <a:chOff x="0" y="0"/>
+          <a:chExt cx="0" cy="0"/>
+        </a:xfrm>
+      </p:grpSpPr>
+      <p:sp>
+        <p:nvSpPr>
+          <p:cNvPr id="2" name="Title 1">
+            <a:extLst>
+              <a:ext uri="{FF2B5EF4-FFF2-40B4-BE49-F238E27FC236}">
+                <a16:creationId xmlns:a16="http://schemas.microsoft.com/office/drawing/2014/main" id="{8D34D888-6D48-2F0A-9D85-3D44A7748E7B}"/>
+              </a:ext>
+            </a:extLst>
+          </p:cNvPr>
+          <p:cNvSpPr>
+            <a:spLocks noGrp="1"/>
+          </p:cNvSpPr>
+          <p:nvPr>
+            <p:ph type="title"/>
+          </p:nvPr>
+        </p:nvSpPr>
+        <p:spPr/>
+        <p:txBody>
+          <a:bodyPr/>
+          <a:lstStyle/>
+          <a:p>
+            <a:r>
+              <a:rPr lang="en-IN" dirty="0"/>
+              <a:t>Non-Trivial Triples</a:t>
+            </a:r>
+          </a:p>
+        </p:txBody>
+      </p:sp>
+      <p:sp>
+        <p:nvSpPr>
+          <p:cNvPr id="4" name="TextBox 3">
+            <a:extLst>
+              <a:ext uri="{FF2B5EF4-FFF2-40B4-BE49-F238E27FC236}">
+                <a16:creationId xmlns:a16="http://schemas.microsoft.com/office/drawing/2014/main" id="{23D55ED8-77E9-EAD3-70B3-77907FCA9060}"/>
+              </a:ext>
+            </a:extLst>
+          </p:cNvPr>
+          <p:cNvSpPr txBox="1"/>
+          <p:nvPr/>
+        </p:nvSpPr>
+        <p:spPr>
+          <a:xfrm>
+            <a:off x="274320" y="3239589"/>
+            <a:ext cx="12730480" cy="3970318"/>
+          </a:xfrm>
+          <a:prstGeom prst="rect">
+            <a:avLst/>
+          </a:prstGeom>
+          <a:noFill/>
+          <a:ln w="12700" cap="flat">
+            <a:noFill/>
+            <a:miter lim="400000"/>
+          </a:ln>
+          <a:effectLst/>
+          <a:sp3d/>
+        </p:spPr>
+        <p:style>
+          <a:lnRef idx="0">
+            <a:scrgbClr r="0" g="0" b="0"/>
+          </a:lnRef>
+          <a:fillRef idx="0">
+            <a:scrgbClr r="0" g="0" b="0"/>
+          </a:fillRef>
+          <a:effectRef idx="0">
+            <a:scrgbClr r="0" g="0" b="0"/>
+          </a:effectRef>
+          <a:fontRef idx="none"/>
+        </p:style>
+        <p:txBody>
+          <a:bodyPr wrap="square">
+            <a:spAutoFit/>
+          </a:bodyPr>
+          <a:lstStyle/>
+          <a:p>
+            <a:r>
+              <a:rPr lang="en-IN" dirty="0"/>
+              <a:t>&lt;T&gt; x := y; z := x &lt;z = y&gt;              </a:t>
+            </a:r>
+            <a:r>
+              <a:rPr lang="en-IN" dirty="0">
+                <a:highlight>
+                  <a:srgbClr val="FF0000"/>
+                </a:highlight>
+              </a:rPr>
+              <a:t>-- Not Valid</a:t>
+            </a:r>
+          </a:p>
+          <a:p>
+            <a:endParaRPr lang="en-IN" dirty="0"/>
+          </a:p>
+          <a:p>
+            <a:r>
+              <a:rPr lang="en-IN" dirty="0"/>
+              <a:t>As final states satisfying x not equal to y are not reachable</a:t>
+            </a:r>
+          </a:p>
+          <a:p>
+            <a:endParaRPr lang="en-IN" dirty="0"/>
+          </a:p>
+          <a:p>
+            <a:r>
+              <a:rPr lang="en-IN" dirty="0"/>
+              <a:t>&lt;T&gt; x := y; z := x &lt;z = y ^ x = y&gt;   </a:t>
+            </a:r>
+            <a:r>
+              <a:rPr lang="en-IN" dirty="0">
+                <a:highlight>
+                  <a:srgbClr val="00FF00"/>
+                </a:highlight>
+              </a:rPr>
+              <a:t>-- Valid</a:t>
+            </a:r>
           </a:p>
         </p:txBody>
       </p:sp>
     </p:spTree>
+    <p:extLst>
+      <p:ext uri="{BB962C8B-B14F-4D97-AF65-F5344CB8AC3E}">
+        <p14:creationId xmlns:p14="http://schemas.microsoft.com/office/powerpoint/2010/main" val="583316358"/>
+      </p:ext>
+    </p:extLst>
   </p:cSld>
   <p:clrMapOvr>
     <a:masterClrMapping/>
@@ -2551,7 +3948,7 @@
           <p:cNvPr id="2" name="Title 1">
             <a:extLst>
               <a:ext uri="{FF2B5EF4-FFF2-40B4-BE49-F238E27FC236}">
-                <a16:creationId xmlns:a16="http://schemas.microsoft.com/office/drawing/2014/main" id="{C4A322CE-19A7-E316-8E4D-E19957A62C70}"/>
+                <a16:creationId xmlns:a16="http://schemas.microsoft.com/office/drawing/2014/main" id="{533EF51E-37A5-E55F-8D5C-0A3C56E911E3}"/>
               </a:ext>
             </a:extLst>
           </p:cNvPr>
@@ -2568,16 +3965,110 @@
           <a:lstStyle/>
           <a:p>
             <a:r>
-              <a:rPr lang="en-US" dirty="0"/>
-              <a:t>[Why is it interesting?]</a:t>
+              <a:rPr lang="en-IN" dirty="0"/>
+              <a:t>Meme [3]</a:t>
             </a:r>
           </a:p>
         </p:txBody>
       </p:sp>
+      <p:pic>
+        <p:nvPicPr>
+          <p:cNvPr id="1026" name="Picture 2">
+            <a:extLst>
+              <a:ext uri="{FF2B5EF4-FFF2-40B4-BE49-F238E27FC236}">
+                <a16:creationId xmlns:a16="http://schemas.microsoft.com/office/drawing/2014/main" id="{CAB588D9-D3F3-899F-9F26-303A6719C3BF}"/>
+              </a:ext>
+            </a:extLst>
+          </p:cNvPr>
+          <p:cNvPicPr>
+            <a:picLocks noChangeAspect="1" noChangeArrowheads="1"/>
+          </p:cNvPicPr>
+          <p:nvPr/>
+        </p:nvPicPr>
+        <p:blipFill>
+          <a:blip r:embed="rId2">
+            <a:extLst>
+              <a:ext uri="{28A0092B-C50C-407E-A947-70E740481C1C}">
+                <a14:useLocalDpi xmlns:a14="http://schemas.microsoft.com/office/drawing/2010/main" val="0"/>
+              </a:ext>
+            </a:extLst>
+          </a:blip>
+          <a:srcRect/>
+          <a:stretch>
+            <a:fillRect/>
+          </a:stretch>
+        </p:blipFill>
+        <p:spPr bwMode="auto">
+          <a:xfrm>
+            <a:off x="-127738" y="1720129"/>
+            <a:ext cx="13132538" cy="7379658"/>
+          </a:xfrm>
+          <a:prstGeom prst="rect">
+            <a:avLst/>
+          </a:prstGeom>
+          <a:noFill/>
+          <a:extLst>
+            <a:ext uri="{909E8E84-426E-40DD-AFC4-6F175D3DCCD1}">
+              <a14:hiddenFill xmlns:a14="http://schemas.microsoft.com/office/drawing/2010/main">
+                <a:solidFill>
+                  <a:srgbClr val="FFFFFF"/>
+                </a:solidFill>
+              </a14:hiddenFill>
+            </a:ext>
+          </a:extLst>
+        </p:spPr>
+      </p:pic>
+      <p:pic>
+        <p:nvPicPr>
+          <p:cNvPr id="1030" name="Picture 6">
+            <a:extLst>
+              <a:ext uri="{FF2B5EF4-FFF2-40B4-BE49-F238E27FC236}">
+                <a16:creationId xmlns:a16="http://schemas.microsoft.com/office/drawing/2014/main" id="{103D7E92-71C6-BBAA-696F-5EA3D9639F6D}"/>
+              </a:ext>
+            </a:extLst>
+          </p:cNvPr>
+          <p:cNvPicPr>
+            <a:picLocks noChangeAspect="1" noChangeArrowheads="1"/>
+          </p:cNvPicPr>
+          <p:nvPr/>
+        </p:nvPicPr>
+        <p:blipFill>
+          <a:blip r:embed="rId3" cstate="print">
+            <a:extLst>
+              <a:ext uri="{28A0092B-C50C-407E-A947-70E740481C1C}">
+                <a14:useLocalDpi xmlns:a14="http://schemas.microsoft.com/office/drawing/2010/main" val="0"/>
+              </a:ext>
+            </a:extLst>
+          </a:blip>
+          <a:srcRect/>
+          <a:stretch>
+            <a:fillRect/>
+          </a:stretch>
+        </p:blipFill>
+        <p:spPr bwMode="auto">
+          <a:xfrm>
+            <a:off x="9725414" y="2442332"/>
+            <a:ext cx="2768764" cy="2768764"/>
+          </a:xfrm>
+          <a:prstGeom prst="rect">
+            <a:avLst/>
+          </a:prstGeom>
+          <a:noFill/>
+          <a:extLst>
+            <a:ext uri="{909E8E84-426E-40DD-AFC4-6F175D3DCCD1}">
+              <a14:hiddenFill xmlns:a14="http://schemas.microsoft.com/office/drawing/2010/main">
+                <a:solidFill>
+                  <a:srgbClr val="FFFFFF"/>
+                </a:solidFill>
+              </a14:hiddenFill>
+            </a:ext>
+          </a:extLst>
+        </p:spPr>
+      </p:pic>
     </p:spTree>
     <p:extLst>
       <p:ext uri="{BB962C8B-B14F-4D97-AF65-F5344CB8AC3E}">
-        <p14:creationId xmlns:p14="http://schemas.microsoft.com/office/powerpoint/2010/main" val="2395409305"/>
+        <p14:creationId xmlns:p14="http://schemas.microsoft.com/office/powerpoint/2010/main" val="4294321520"/>
       </p:ext>
     </p:extLst>
   </p:cSld>
@@ -2610,7 +4101,7 @@
           <p:cNvPr id="2" name="Title 1">
             <a:extLst>
               <a:ext uri="{FF2B5EF4-FFF2-40B4-BE49-F238E27FC236}">
-                <a16:creationId xmlns:a16="http://schemas.microsoft.com/office/drawing/2014/main" id="{0D48D4F0-6CF4-E469-470F-64E88B2C0C24}"/>
+                <a16:creationId xmlns:a16="http://schemas.microsoft.com/office/drawing/2014/main" id="{ABD2A74A-6CAF-633C-26FC-A4566360E039}"/>
               </a:ext>
             </a:extLst>
           </p:cNvPr>
@@ -2627,16 +4118,214 @@
           <a:lstStyle/>
           <a:p>
             <a:r>
-              <a:rPr lang="en-US" dirty="0"/>
-              <a:t>[Why is it hard?]</a:t>
+              <a:rPr lang="en-IN" dirty="0"/>
+              <a:t>Adversarial Logic</a:t>
             </a:r>
           </a:p>
         </p:txBody>
       </p:sp>
+      <p:sp>
+        <p:nvSpPr>
+          <p:cNvPr id="4" name="TextBox 3">
+            <a:extLst>
+              <a:ext uri="{FF2B5EF4-FFF2-40B4-BE49-F238E27FC236}">
+                <a16:creationId xmlns:a16="http://schemas.microsoft.com/office/drawing/2014/main" id="{425E092B-DC8D-7B57-CF4A-92E38E6AB92D}"/>
+              </a:ext>
+            </a:extLst>
+          </p:cNvPr>
+          <p:cNvSpPr txBox="1"/>
+          <p:nvPr/>
+        </p:nvSpPr>
+        <p:spPr>
+          <a:xfrm>
+            <a:off x="326572" y="1774546"/>
+            <a:ext cx="10737669" cy="3980577"/>
+          </a:xfrm>
+          <a:prstGeom prst="rect">
+            <a:avLst/>
+          </a:prstGeom>
+          <a:noFill/>
+          <a:ln w="12700" cap="flat">
+            <a:noFill/>
+            <a:miter lim="400000"/>
+          </a:ln>
+          <a:effectLst/>
+          <a:sp3d/>
+        </p:spPr>
+        <p:style>
+          <a:lnRef idx="0">
+            <a:scrgbClr r="0" g="0" b="0"/>
+          </a:lnRef>
+          <a:fillRef idx="0">
+            <a:scrgbClr r="0" g="0" b="0"/>
+          </a:fillRef>
+          <a:effectRef idx="0">
+            <a:scrgbClr r="0" g="0" b="0"/>
+          </a:effectRef>
+          <a:fontRef idx="none"/>
+        </p:style>
+        <p:txBody>
+          <a:bodyPr rot="0" spcFirstLastPara="1" vertOverflow="overflow" horzOverflow="overflow" vert="horz" wrap="square" lIns="50800" tIns="50800" rIns="50800" bIns="50800" numCol="1" spcCol="38100" rtlCol="0" anchor="ctr">
+            <a:spAutoFit/>
+          </a:bodyPr>
+          <a:lstStyle/>
+          <a:p>
+            <a:pPr marL="0" marR="0" indent="0" algn="l" defTabSz="584200" rtl="0" fontAlgn="auto" latinLnBrk="0" hangingPunct="0">
+              <a:lnSpc>
+                <a:spcPct val="100000"/>
+              </a:lnSpc>
+              <a:spcBef>
+                <a:spcPts val="0"/>
+              </a:spcBef>
+              <a:spcAft>
+                <a:spcPts val="0"/>
+              </a:spcAft>
+              <a:buClrTx/>
+              <a:buSzTx/>
+              <a:buFontTx/>
+              <a:buNone/>
+              <a:tabLst/>
+            </a:pPr>
+            <a:r>
+              <a:rPr kumimoji="0" lang="en-IN" sz="4200" b="0" i="0" u="none" strike="noStrike" cap="none" spc="0" normalizeH="0" baseline="0" dirty="0">
+                <a:ln>
+                  <a:noFill/>
+                </a:ln>
+                <a:solidFill>
+                  <a:srgbClr val="000000"/>
+                </a:solidFill>
+                <a:effectLst/>
+                <a:uFillTx/>
+                <a:latin typeface="Futura"/>
+                <a:ea typeface="Futura"/>
+                <a:cs typeface="Futura"/>
+                <a:sym typeface="Futura"/>
+              </a:rPr>
+              <a:t>A program and adversary</a:t>
+            </a:r>
+          </a:p>
+          <a:p>
+            <a:pPr marL="0" marR="0" indent="0" algn="l" defTabSz="584200" rtl="0" fontAlgn="auto" latinLnBrk="0" hangingPunct="0">
+              <a:lnSpc>
+                <a:spcPct val="100000"/>
+              </a:lnSpc>
+              <a:spcBef>
+                <a:spcPts val="0"/>
+              </a:spcBef>
+              <a:spcAft>
+                <a:spcPts val="0"/>
+              </a:spcAft>
+              <a:buClrTx/>
+              <a:buSzTx/>
+              <a:buFontTx/>
+              <a:buNone/>
+              <a:tabLst/>
+            </a:pPr>
+            <a:endParaRPr lang="en-IN" dirty="0"/>
+          </a:p>
+          <a:p>
+            <a:pPr marL="0" marR="0" indent="0" algn="l" defTabSz="584200" rtl="0" fontAlgn="auto" latinLnBrk="0" hangingPunct="0">
+              <a:lnSpc>
+                <a:spcPct val="100000"/>
+              </a:lnSpc>
+              <a:spcBef>
+                <a:spcPts val="0"/>
+              </a:spcBef>
+              <a:spcAft>
+                <a:spcPts val="0"/>
+              </a:spcAft>
+              <a:buClrTx/>
+              <a:buSzTx/>
+              <a:buFontTx/>
+              <a:buNone/>
+              <a:tabLst/>
+            </a:pPr>
+            <a:r>
+              <a:rPr kumimoji="0" lang="en-IN" sz="4200" b="0" i="0" u="none" strike="noStrike" cap="none" spc="0" normalizeH="0" baseline="0" dirty="0">
+                <a:ln>
+                  <a:noFill/>
+                </a:ln>
+                <a:solidFill>
+                  <a:srgbClr val="000000"/>
+                </a:solidFill>
+                <a:effectLst/>
+                <a:uFillTx/>
+                <a:latin typeface="Futura"/>
+                <a:ea typeface="Futura"/>
+                <a:cs typeface="Futura"/>
+                <a:sym typeface="Futura"/>
+              </a:rPr>
+              <a:t>Extends Incorrectness to channels which leads to composition of attacker and program</a:t>
+            </a:r>
+          </a:p>
+          <a:p>
+            <a:pPr marL="0" marR="0" indent="0" algn="l" defTabSz="584200" rtl="0" fontAlgn="auto" latinLnBrk="0" hangingPunct="0">
+              <a:lnSpc>
+                <a:spcPct val="100000"/>
+              </a:lnSpc>
+              <a:spcBef>
+                <a:spcPts val="0"/>
+              </a:spcBef>
+              <a:spcAft>
+                <a:spcPts val="0"/>
+              </a:spcAft>
+              <a:buClrTx/>
+              <a:buSzTx/>
+              <a:buFontTx/>
+              <a:buNone/>
+              <a:tabLst/>
+            </a:pPr>
+            <a:endParaRPr kumimoji="0" lang="en-IN" sz="4200" b="0" i="0" u="none" strike="noStrike" cap="none" spc="0" normalizeH="0" baseline="0" dirty="0">
+              <a:ln>
+                <a:noFill/>
+              </a:ln>
+              <a:solidFill>
+                <a:srgbClr val="000000"/>
+              </a:solidFill>
+              <a:effectLst/>
+              <a:uFillTx/>
+              <a:latin typeface="Futura"/>
+              <a:ea typeface="Futura"/>
+              <a:cs typeface="Futura"/>
+              <a:sym typeface="Futura"/>
+            </a:endParaRPr>
+          </a:p>
+        </p:txBody>
+      </p:sp>
+      <p:pic>
+        <p:nvPicPr>
+          <p:cNvPr id="6" name="Picture 5" descr="A screenshot of a computer program&#10;&#10;AI-generated content may be incorrect.">
+            <a:extLst>
+              <a:ext uri="{FF2B5EF4-FFF2-40B4-BE49-F238E27FC236}">
+                <a16:creationId xmlns:a16="http://schemas.microsoft.com/office/drawing/2014/main" id="{E14E8CA0-7F09-5480-DC5E-083FE71F96BA}"/>
+              </a:ext>
+            </a:extLst>
+          </p:cNvPr>
+          <p:cNvPicPr>
+            <a:picLocks noChangeAspect="1"/>
+          </p:cNvPicPr>
+          <p:nvPr/>
+        </p:nvPicPr>
+        <p:blipFill>
+          <a:blip r:embed="rId2"/>
+          <a:stretch>
+            <a:fillRect/>
+          </a:stretch>
+        </p:blipFill>
+        <p:spPr>
+          <a:xfrm>
+            <a:off x="4524288" y="4776357"/>
+            <a:ext cx="6934556" cy="4407126"/>
+          </a:xfrm>
+          <a:prstGeom prst="rect">
+            <a:avLst/>
+          </a:prstGeom>
+        </p:spPr>
+      </p:pic>
     </p:spTree>
     <p:extLst>
       <p:ext uri="{BB962C8B-B14F-4D97-AF65-F5344CB8AC3E}">
-        <p14:creationId xmlns:p14="http://schemas.microsoft.com/office/powerpoint/2010/main" val="4278172502"/>
+        <p14:creationId xmlns:p14="http://schemas.microsoft.com/office/powerpoint/2010/main" val="1391347631"/>
       </p:ext>
     </p:extLst>
   </p:cSld>
@@ -2669,7 +4358,7 @@
           <p:cNvPr id="2" name="Title 1">
             <a:extLst>
               <a:ext uri="{FF2B5EF4-FFF2-40B4-BE49-F238E27FC236}">
-                <a16:creationId xmlns:a16="http://schemas.microsoft.com/office/drawing/2014/main" id="{C8F2038A-75E9-52F0-9900-A63200520772}"/>
+                <a16:creationId xmlns:a16="http://schemas.microsoft.com/office/drawing/2014/main" id="{02993ACF-E36D-2B9C-48FE-BDDF43E45A33}"/>
               </a:ext>
             </a:extLst>
           </p:cNvPr>
@@ -2686,16 +4375,46 @@
           <a:lstStyle/>
           <a:p>
             <a:r>
-              <a:rPr lang="en-US" dirty="0"/>
-              <a:t>[What is the contribution?]</a:t>
+              <a:rPr lang="en-IN" dirty="0"/>
+              <a:t>Attack trace</a:t>
             </a:r>
           </a:p>
         </p:txBody>
       </p:sp>
+      <p:pic>
+        <p:nvPicPr>
+          <p:cNvPr id="4" name="Picture 3" descr="A black screen with white text and colorful text&#10;&#10;AI-generated content may be incorrect.">
+            <a:extLst>
+              <a:ext uri="{FF2B5EF4-FFF2-40B4-BE49-F238E27FC236}">
+                <a16:creationId xmlns:a16="http://schemas.microsoft.com/office/drawing/2014/main" id="{B4486FBF-9575-5D52-FCF9-BD0BD26B1E3F}"/>
+              </a:ext>
+            </a:extLst>
+          </p:cNvPr>
+          <p:cNvPicPr>
+            <a:picLocks noChangeAspect="1"/>
+          </p:cNvPicPr>
+          <p:nvPr/>
+        </p:nvPicPr>
+        <p:blipFill>
+          <a:blip r:embed="rId2"/>
+          <a:stretch>
+            <a:fillRect/>
+          </a:stretch>
+        </p:blipFill>
+        <p:spPr>
+          <a:xfrm>
+            <a:off x="2185449" y="1485495"/>
+            <a:ext cx="8308786" cy="8268105"/>
+          </a:xfrm>
+          <a:prstGeom prst="rect">
+            <a:avLst/>
+          </a:prstGeom>
+        </p:spPr>
+      </p:pic>
     </p:spTree>
     <p:extLst>
       <p:ext uri="{BB962C8B-B14F-4D97-AF65-F5344CB8AC3E}">
-        <p14:creationId xmlns:p14="http://schemas.microsoft.com/office/powerpoint/2010/main" val="1202571325"/>
+        <p14:creationId xmlns:p14="http://schemas.microsoft.com/office/powerpoint/2010/main" val="3137401260"/>
       </p:ext>
     </p:extLst>
   </p:cSld>
@@ -2728,7 +4447,7 @@
           <p:cNvPr id="2" name="Title 1">
             <a:extLst>
               <a:ext uri="{FF2B5EF4-FFF2-40B4-BE49-F238E27FC236}">
-                <a16:creationId xmlns:a16="http://schemas.microsoft.com/office/drawing/2014/main" id="{FF0B19DC-7505-6DCD-AD63-DFBCD7CCFA72}"/>
+                <a16:creationId xmlns:a16="http://schemas.microsoft.com/office/drawing/2014/main" id="{86258A56-2A7C-2ABB-F4B5-896711ED23A3}"/>
               </a:ext>
             </a:extLst>
           </p:cNvPr>
@@ -2745,16 +4464,279 @@
           <a:lstStyle/>
           <a:p>
             <a:r>
+              <a:rPr lang="en-IN" dirty="0"/>
+              <a:t>Limitations</a:t>
+            </a:r>
+          </a:p>
+        </p:txBody>
+      </p:sp>
+      <p:pic>
+        <p:nvPicPr>
+          <p:cNvPr id="1026" name="Picture 2" descr="3d illustration of abstract technology background with glowing lines and dots, Modern digital abstract 3D background. Can be used in the description of network abilities, AI Generated photo">
+            <a:extLst>
+              <a:ext uri="{FF2B5EF4-FFF2-40B4-BE49-F238E27FC236}">
+                <a16:creationId xmlns:a16="http://schemas.microsoft.com/office/drawing/2014/main" id="{0BF72641-3051-BC35-C436-731FCC38CED3}"/>
+              </a:ext>
+            </a:extLst>
+          </p:cNvPr>
+          <p:cNvPicPr>
+            <a:picLocks noChangeAspect="1" noChangeArrowheads="1"/>
+          </p:cNvPicPr>
+          <p:nvPr/>
+        </p:nvPicPr>
+        <p:blipFill>
+          <a:blip r:embed="rId2">
+            <a:extLst>
+              <a:ext uri="{28A0092B-C50C-407E-A947-70E740481C1C}">
+                <a14:useLocalDpi xmlns:a14="http://schemas.microsoft.com/office/drawing/2010/main" val="0"/>
+              </a:ext>
+            </a:extLst>
+          </a:blip>
+          <a:srcRect/>
+          <a:stretch>
+            <a:fillRect/>
+          </a:stretch>
+        </p:blipFill>
+        <p:spPr bwMode="auto">
+          <a:xfrm>
+            <a:off x="8516983" y="6761722"/>
+            <a:ext cx="4487817" cy="2991878"/>
+          </a:xfrm>
+          <a:prstGeom prst="rect">
+            <a:avLst/>
+          </a:prstGeom>
+          <a:noFill/>
+          <a:extLst>
+            <a:ext uri="{909E8E84-426E-40DD-AFC4-6F175D3DCCD1}">
+              <a14:hiddenFill xmlns:a14="http://schemas.microsoft.com/office/drawing/2010/main">
+                <a:solidFill>
+                  <a:srgbClr val="FFFFFF"/>
+                </a:solidFill>
+              </a14:hiddenFill>
+            </a:ext>
+          </a:extLst>
+        </p:spPr>
+      </p:pic>
+      <p:sp>
+        <p:nvSpPr>
+          <p:cNvPr id="3" name="TextBox 2">
+            <a:extLst>
+              <a:ext uri="{FF2B5EF4-FFF2-40B4-BE49-F238E27FC236}">
+                <a16:creationId xmlns:a16="http://schemas.microsoft.com/office/drawing/2014/main" id="{7E71963D-96A7-A56E-2288-641DEF8C77E8}"/>
+              </a:ext>
+            </a:extLst>
+          </p:cNvPr>
+          <p:cNvSpPr txBox="1"/>
+          <p:nvPr/>
+        </p:nvSpPr>
+        <p:spPr>
+          <a:xfrm>
+            <a:off x="239984" y="1412505"/>
+            <a:ext cx="11728767" cy="7858562"/>
+          </a:xfrm>
+          <a:prstGeom prst="rect">
+            <a:avLst/>
+          </a:prstGeom>
+          <a:noFill/>
+          <a:ln w="12700" cap="flat">
+            <a:noFill/>
+            <a:miter lim="400000"/>
+          </a:ln>
+          <a:effectLst/>
+          <a:sp3d/>
+        </p:spPr>
+        <p:style>
+          <a:lnRef idx="0">
+            <a:scrgbClr r="0" g="0" b="0"/>
+          </a:lnRef>
+          <a:fillRef idx="0">
+            <a:scrgbClr r="0" g="0" b="0"/>
+          </a:fillRef>
+          <a:effectRef idx="0">
+            <a:scrgbClr r="0" g="0" b="0"/>
+          </a:effectRef>
+          <a:fontRef idx="none"/>
+        </p:style>
+        <p:txBody>
+          <a:bodyPr rot="0" spcFirstLastPara="1" vertOverflow="overflow" horzOverflow="overflow" vert="horz" wrap="square" lIns="50800" tIns="50800" rIns="50800" bIns="50800" numCol="1" spcCol="38100" rtlCol="0" anchor="ctr">
+            <a:spAutoFit/>
+          </a:bodyPr>
+          <a:lstStyle/>
+          <a:p>
+            <a:pPr marL="0" marR="0" indent="0" algn="l" defTabSz="584200" rtl="0" fontAlgn="auto" latinLnBrk="0" hangingPunct="0">
+              <a:lnSpc>
+                <a:spcPct val="100000"/>
+              </a:lnSpc>
+              <a:spcBef>
+                <a:spcPts val="0"/>
+              </a:spcBef>
+              <a:spcAft>
+                <a:spcPts val="0"/>
+              </a:spcAft>
+              <a:buClrTx/>
+              <a:buSzTx/>
+              <a:buFontTx/>
+              <a:buNone/>
+              <a:tabLst/>
+            </a:pPr>
+            <a:r>
+              <a:rPr lang="en-IN" dirty="0"/>
+              <a:t>You can compose multiple programs in AL itself as pointed by Kirby</a:t>
+            </a:r>
+          </a:p>
+          <a:p>
+            <a:pPr marL="0" marR="0" indent="0" algn="l" defTabSz="584200" rtl="0" fontAlgn="auto" latinLnBrk="0" hangingPunct="0">
+              <a:lnSpc>
+                <a:spcPct val="100000"/>
+              </a:lnSpc>
+              <a:spcBef>
+                <a:spcPts val="0"/>
+              </a:spcBef>
+              <a:spcAft>
+                <a:spcPts val="0"/>
+              </a:spcAft>
+              <a:buClrTx/>
+              <a:buSzTx/>
+              <a:buFontTx/>
+              <a:buNone/>
+              <a:tabLst/>
+            </a:pPr>
+            <a:endParaRPr lang="en-IN" dirty="0"/>
+          </a:p>
+          <a:p>
+            <a:pPr marL="571500" indent="-571500">
+              <a:buFont typeface="Arial" panose="020B0604020202020204" pitchFamily="34" charset="0"/>
+              <a:buChar char="•"/>
+            </a:pPr>
+            <a:r>
               <a:rPr lang="en-US" dirty="0"/>
-              <a:t>Contributions</a:t>
-            </a:r>
+              <a:t>The "Monolithic State" Problem (You have to model separation of concern)</a:t>
+            </a:r>
+          </a:p>
+          <a:p>
+            <a:pPr marL="571500" indent="-571500">
+              <a:buFont typeface="Arial" panose="020B0604020202020204" pitchFamily="34" charset="0"/>
+              <a:buChar char="•"/>
+            </a:pPr>
+            <a:r>
+              <a:rPr lang="en-IN" dirty="0"/>
+              <a:t>Replication and Asynchrony (!P)</a:t>
+            </a:r>
+          </a:p>
+          <a:p>
+            <a:pPr marL="571500" indent="-571500">
+              <a:buFont typeface="Arial" panose="020B0604020202020204" pitchFamily="34" charset="0"/>
+              <a:buChar char="•"/>
+            </a:pPr>
+            <a:r>
+              <a:rPr lang="en-IN" dirty="0"/>
+              <a:t>Topology is fixed at start, </a:t>
+            </a:r>
+            <a:r>
+              <a:rPr lang="en-IN" dirty="0" err="1"/>
+              <a:t>spi</a:t>
+            </a:r>
+            <a:r>
+              <a:rPr lang="en-IN" dirty="0"/>
+              <a:t>-calc gives us more flexibility to model changes </a:t>
+            </a:r>
+          </a:p>
+          <a:p>
+            <a:pPr marL="571500" indent="-571500">
+              <a:buFont typeface="Arial" panose="020B0604020202020204" pitchFamily="34" charset="0"/>
+              <a:buChar char="•"/>
+            </a:pPr>
+            <a:endParaRPr lang="en-US" b="1" dirty="0"/>
+          </a:p>
+          <a:p>
+            <a:pPr marL="0" marR="0" indent="0" algn="l" defTabSz="584200" rtl="0" fontAlgn="auto" latinLnBrk="0" hangingPunct="0">
+              <a:lnSpc>
+                <a:spcPct val="100000"/>
+              </a:lnSpc>
+              <a:spcBef>
+                <a:spcPts val="0"/>
+              </a:spcBef>
+              <a:spcAft>
+                <a:spcPts val="0"/>
+              </a:spcAft>
+              <a:buClrTx/>
+              <a:buSzTx/>
+              <a:buFontTx/>
+              <a:buNone/>
+              <a:tabLst/>
+            </a:pPr>
+            <a:endParaRPr kumimoji="0" lang="en-IN" sz="4200" b="0" i="0" u="none" strike="noStrike" cap="none" spc="0" normalizeH="0" baseline="0" dirty="0">
+              <a:ln>
+                <a:noFill/>
+              </a:ln>
+              <a:solidFill>
+                <a:srgbClr val="000000"/>
+              </a:solidFill>
+              <a:effectLst/>
+              <a:uFillTx/>
+              <a:latin typeface="Futura"/>
+              <a:ea typeface="Futura"/>
+              <a:cs typeface="Futura"/>
+              <a:sym typeface="Futura"/>
+            </a:endParaRPr>
+          </a:p>
+          <a:p>
+            <a:pPr marL="0" marR="0" indent="0" algn="l" defTabSz="584200" rtl="0" fontAlgn="auto" latinLnBrk="0" hangingPunct="0">
+              <a:lnSpc>
+                <a:spcPct val="100000"/>
+              </a:lnSpc>
+              <a:spcBef>
+                <a:spcPts val="0"/>
+              </a:spcBef>
+              <a:spcAft>
+                <a:spcPts val="0"/>
+              </a:spcAft>
+              <a:buClrTx/>
+              <a:buSzTx/>
+              <a:buFontTx/>
+              <a:buNone/>
+              <a:tabLst/>
+            </a:pPr>
+            <a:endParaRPr lang="en-IN" dirty="0"/>
+          </a:p>
+          <a:p>
+            <a:pPr marL="0" marR="0" indent="0" algn="l" defTabSz="584200" rtl="0" fontAlgn="auto" latinLnBrk="0" hangingPunct="0">
+              <a:lnSpc>
+                <a:spcPct val="100000"/>
+              </a:lnSpc>
+              <a:spcBef>
+                <a:spcPts val="0"/>
+              </a:spcBef>
+              <a:spcAft>
+                <a:spcPts val="0"/>
+              </a:spcAft>
+              <a:buClrTx/>
+              <a:buSzTx/>
+              <a:buFontTx/>
+              <a:buNone/>
+              <a:tabLst/>
+            </a:pPr>
+            <a:endParaRPr kumimoji="0" lang="en-IN" sz="4200" b="0" i="0" u="none" strike="noStrike" cap="none" spc="0" normalizeH="0" baseline="0" dirty="0">
+              <a:ln>
+                <a:noFill/>
+              </a:ln>
+              <a:solidFill>
+                <a:srgbClr val="000000"/>
+              </a:solidFill>
+              <a:effectLst/>
+              <a:uFillTx/>
+              <a:latin typeface="Futura"/>
+              <a:ea typeface="Futura"/>
+              <a:cs typeface="Futura"/>
+              <a:sym typeface="Futura"/>
+            </a:endParaRPr>
           </a:p>
         </p:txBody>
       </p:sp>
     </p:spTree>
     <p:extLst>
       <p:ext uri="{BB962C8B-B14F-4D97-AF65-F5344CB8AC3E}">
-        <p14:creationId xmlns:p14="http://schemas.microsoft.com/office/powerpoint/2010/main" val="4273581678"/>
+        <p14:creationId xmlns:p14="http://schemas.microsoft.com/office/powerpoint/2010/main" val="1006323618"/>
       </p:ext>
     </p:extLst>
   </p:cSld>
@@ -2787,7 +4769,7 @@
           <p:cNvPr id="2" name="Title 1">
             <a:extLst>
               <a:ext uri="{FF2B5EF4-FFF2-40B4-BE49-F238E27FC236}">
-                <a16:creationId xmlns:a16="http://schemas.microsoft.com/office/drawing/2014/main" id="{6C4E20D1-753C-9177-3FD7-05E87A9A894B}"/>
+                <a16:creationId xmlns:a16="http://schemas.microsoft.com/office/drawing/2014/main" id="{4612E401-E1AC-F57B-68F5-4A6B32816B45}"/>
               </a:ext>
             </a:extLst>
           </p:cNvPr>
@@ -2804,16 +4786,46 @@
           <a:lstStyle/>
           <a:p>
             <a:r>
-              <a:rPr lang="en-US" dirty="0"/>
-              <a:t>[Contribution 1]</a:t>
+              <a:rPr lang="en-IN" dirty="0"/>
+              <a:t>Composition as a Monoid (||)</a:t>
             </a:r>
           </a:p>
         </p:txBody>
       </p:sp>
+      <p:pic>
+        <p:nvPicPr>
+          <p:cNvPr id="4" name="Picture 3">
+            <a:extLst>
+              <a:ext uri="{FF2B5EF4-FFF2-40B4-BE49-F238E27FC236}">
+                <a16:creationId xmlns:a16="http://schemas.microsoft.com/office/drawing/2014/main" id="{8003FCB3-F34F-E865-6612-A19F26F15198}"/>
+              </a:ext>
+            </a:extLst>
+          </p:cNvPr>
+          <p:cNvPicPr>
+            <a:picLocks noChangeAspect="1"/>
+          </p:cNvPicPr>
+          <p:nvPr/>
+        </p:nvPicPr>
+        <p:blipFill>
+          <a:blip r:embed="rId2"/>
+          <a:stretch>
+            <a:fillRect/>
+          </a:stretch>
+        </p:blipFill>
+        <p:spPr>
+          <a:xfrm>
+            <a:off x="2325189" y="2808369"/>
+            <a:ext cx="7376764" cy="5163736"/>
+          </a:xfrm>
+          <a:prstGeom prst="rect">
+            <a:avLst/>
+          </a:prstGeom>
+        </p:spPr>
+      </p:pic>
     </p:spTree>
     <p:extLst>
       <p:ext uri="{BB962C8B-B14F-4D97-AF65-F5344CB8AC3E}">
-        <p14:creationId xmlns:p14="http://schemas.microsoft.com/office/powerpoint/2010/main" val="327482607"/>
+        <p14:creationId xmlns:p14="http://schemas.microsoft.com/office/powerpoint/2010/main" val="2449467062"/>
       </p:ext>
     </p:extLst>
   </p:cSld>
@@ -2829,13 +4841,7 @@
   <p:cSld>
     <p:spTree>
       <p:nvGrpSpPr>
-        <p:cNvPr id="1" name="">
-          <a:extLst>
-            <a:ext uri="{FF2B5EF4-FFF2-40B4-BE49-F238E27FC236}">
-              <a16:creationId xmlns:a16="http://schemas.microsoft.com/office/drawing/2014/main" id="{E705F187-BCFA-999D-20C4-063F1E717119}"/>
-            </a:ext>
-          </a:extLst>
-        </p:cNvPr>
+        <p:cNvPr id="1" name=""/>
         <p:cNvGrpSpPr/>
         <p:nvPr/>
       </p:nvGrpSpPr>
@@ -2852,7 +4858,7 @@
           <p:cNvPr id="2" name="Title 1">
             <a:extLst>
               <a:ext uri="{FF2B5EF4-FFF2-40B4-BE49-F238E27FC236}">
-                <a16:creationId xmlns:a16="http://schemas.microsoft.com/office/drawing/2014/main" id="{D47E4393-DB62-4B2B-04ED-6F2959B860D2}"/>
+                <a16:creationId xmlns:a16="http://schemas.microsoft.com/office/drawing/2014/main" id="{8F965662-8062-E1CA-566E-6A5013E515DF}"/>
               </a:ext>
             </a:extLst>
           </p:cNvPr>
@@ -2869,16 +4875,76 @@
           <a:lstStyle/>
           <a:p>
             <a:r>
-              <a:rPr lang="en-US" dirty="0"/>
-              <a:t>[Contribution 2]</a:t>
+              <a:rPr lang="en-IN" dirty="0"/>
+              <a:t>New Goal State</a:t>
             </a:r>
           </a:p>
         </p:txBody>
       </p:sp>
+      <p:pic>
+        <p:nvPicPr>
+          <p:cNvPr id="4" name="Picture 3">
+            <a:extLst>
+              <a:ext uri="{FF2B5EF4-FFF2-40B4-BE49-F238E27FC236}">
+                <a16:creationId xmlns:a16="http://schemas.microsoft.com/office/drawing/2014/main" id="{8DC77F62-A65D-40CD-2BEE-B337434742A0}"/>
+              </a:ext>
+            </a:extLst>
+          </p:cNvPr>
+          <p:cNvPicPr>
+            <a:picLocks noChangeAspect="1"/>
+          </p:cNvPicPr>
+          <p:nvPr/>
+        </p:nvPicPr>
+        <p:blipFill>
+          <a:blip r:embed="rId2"/>
+          <a:stretch>
+            <a:fillRect/>
+          </a:stretch>
+        </p:blipFill>
+        <p:spPr>
+          <a:xfrm>
+            <a:off x="1672046" y="2800798"/>
+            <a:ext cx="8968067" cy="1577717"/>
+          </a:xfrm>
+          <a:prstGeom prst="rect">
+            <a:avLst/>
+          </a:prstGeom>
+        </p:spPr>
+      </p:pic>
+      <p:pic>
+        <p:nvPicPr>
+          <p:cNvPr id="6" name="Picture 5">
+            <a:extLst>
+              <a:ext uri="{FF2B5EF4-FFF2-40B4-BE49-F238E27FC236}">
+                <a16:creationId xmlns:a16="http://schemas.microsoft.com/office/drawing/2014/main" id="{0DCE87A3-2B57-CECD-5735-704A077DAAB8}"/>
+              </a:ext>
+            </a:extLst>
+          </p:cNvPr>
+          <p:cNvPicPr>
+            <a:picLocks noChangeAspect="1"/>
+          </p:cNvPicPr>
+          <p:nvPr/>
+        </p:nvPicPr>
+        <p:blipFill>
+          <a:blip r:embed="rId3"/>
+          <a:stretch>
+            <a:fillRect/>
+          </a:stretch>
+        </p:blipFill>
+        <p:spPr>
+          <a:xfrm>
+            <a:off x="3640166" y="6514365"/>
+            <a:ext cx="5031825" cy="1205783"/>
+          </a:xfrm>
+          <a:prstGeom prst="rect">
+            <a:avLst/>
+          </a:prstGeom>
+        </p:spPr>
+      </p:pic>
     </p:spTree>
     <p:extLst>
       <p:ext uri="{BB962C8B-B14F-4D97-AF65-F5344CB8AC3E}">
-        <p14:creationId xmlns:p14="http://schemas.microsoft.com/office/powerpoint/2010/main" val="1771046817"/>
+        <p14:creationId xmlns:p14="http://schemas.microsoft.com/office/powerpoint/2010/main" val="2900581297"/>
       </p:ext>
     </p:extLst>
   </p:cSld>

</xml_diff>